<commit_message>
JavaScript Lectures and HW 1, 2 README, 3 README
</commit_message>
<xml_diff>
--- a/6. JavaScript Fundamentals/Lectures/7. Functions.pptx
+++ b/6. JavaScript Fundamentals/Lectures/7. Functions.pptx
@@ -159,7 +159,7 @@
   </p:defaultTextStyle>
   <p:extLst>
     <p:ext uri="{EFAFB233-063F-42B5-8137-9DF3F51BA10A}">
-      <p15:sldGuideLst xmlns:p15="http://schemas.microsoft.com/office/powerpoint/2012/main" xmlns=""/>
+      <p15:sldGuideLst xmlns="" xmlns:p15="http://schemas.microsoft.com/office/powerpoint/2012/main"/>
     </p:ext>
   </p:extLst>
 </p:presentation>
@@ -247,7 +247,7 @@
           <a:p>
             <a:fld id="{131BE760-0278-42DE-B288-CD0B8C16D222}" type="datetimeFigureOut">
               <a:rPr lang="en-US" smtClean="0"/>
-              <a:t>4/29/2014</a:t>
+              <a:t>5/8/2014</a:t>
             </a:fld>
             <a:endParaRPr lang="en-US"/>
           </a:p>
@@ -8532,7 +8532,92 @@
                 <a:latin typeface="Consolas" pitchFamily="49" charset="0"/>
                 <a:cs typeface="Consolas" pitchFamily="49" charset="0"/>
               </a:rPr>
-              <a:t>var print = new Function("console.log('Hello')");</a:t>
+              <a:t>var print = new </a:t>
+            </a:r>
+            <a:r>
+              <a:rPr lang="en-US" sz="1800" b="1" noProof="1" smtClean="0">
+                <a:solidFill>
+                  <a:srgbClr val="8CF4F2"/>
+                </a:solidFill>
+                <a:effectLst>
+                  <a:outerShdw blurRad="38100" dist="38100" dir="2700000" algn="tl">
+                    <a:srgbClr val="000000">
+                      <a:alpha val="43137"/>
+                    </a:srgbClr>
+                  </a:outerShdw>
+                </a:effectLst>
+                <a:latin typeface="Consolas" pitchFamily="49" charset="0"/>
+                <a:cs typeface="Consolas" pitchFamily="49" charset="0"/>
+              </a:rPr>
+              <a:t>Function('console.log(</a:t>
+            </a:r>
+            <a:r>
+              <a:rPr lang="en-US" b="1" noProof="1">
+                <a:solidFill>
+                  <a:srgbClr val="8CF4F2"/>
+                </a:solidFill>
+                <a:effectLst>
+                  <a:outerShdw blurRad="38100" dist="38100" dir="2700000" algn="tl">
+                    <a:srgbClr val="000000">
+                      <a:alpha val="43137"/>
+                    </a:srgbClr>
+                  </a:outerShdw>
+                </a:effectLst>
+                <a:latin typeface="Consolas" pitchFamily="49" charset="0"/>
+                <a:cs typeface="Consolas" pitchFamily="49" charset="0"/>
+              </a:rPr>
+              <a:t>"</a:t>
+            </a:r>
+            <a:r>
+              <a:rPr lang="en-US" sz="1800" b="1" noProof="1" smtClean="0">
+                <a:solidFill>
+                  <a:srgbClr val="8CF4F2"/>
+                </a:solidFill>
+                <a:effectLst>
+                  <a:outerShdw blurRad="38100" dist="38100" dir="2700000" algn="tl">
+                    <a:srgbClr val="000000">
+                      <a:alpha val="43137"/>
+                    </a:srgbClr>
+                  </a:outerShdw>
+                </a:effectLst>
+                <a:latin typeface="Consolas" pitchFamily="49" charset="0"/>
+                <a:cs typeface="Consolas" pitchFamily="49" charset="0"/>
+              </a:rPr>
+              <a:t>Hello</a:t>
+            </a:r>
+            <a:r>
+              <a:rPr lang="en-US" b="1" noProof="1">
+                <a:solidFill>
+                  <a:srgbClr val="8CF4F2"/>
+                </a:solidFill>
+                <a:effectLst>
+                  <a:outerShdw blurRad="38100" dist="38100" dir="2700000" algn="tl">
+                    <a:srgbClr val="000000">
+                      <a:alpha val="43137"/>
+                    </a:srgbClr>
+                  </a:outerShdw>
+                </a:effectLst>
+                <a:latin typeface="Consolas" pitchFamily="49" charset="0"/>
+                <a:cs typeface="Consolas" pitchFamily="49" charset="0"/>
+              </a:rPr>
+              <a:t>"</a:t>
+            </a:r>
+            <a:r>
+              <a:rPr lang="en-US" sz="1800" b="1" noProof="1" smtClean="0">
+                <a:solidFill>
+                  <a:srgbClr val="8CF4F2"/>
+                </a:solidFill>
+                <a:effectLst>
+                  <a:outerShdw blurRad="38100" dist="38100" dir="2700000" algn="tl">
+                    <a:srgbClr val="000000">
+                      <a:alpha val="43137"/>
+                    </a:srgbClr>
+                  </a:outerShdw>
+                </a:effectLst>
+                <a:latin typeface="Consolas" pitchFamily="49" charset="0"/>
+                <a:cs typeface="Consolas" pitchFamily="49" charset="0"/>
+              </a:rPr>
+              <a:t>)');</a:t>
             </a:r>
             <a:endParaRPr lang="en-US" sz="1800" b="1" noProof="1">
               <a:solidFill>
@@ -8616,7 +8701,58 @@
                 <a:latin typeface="Consolas" pitchFamily="49" charset="0"/>
                 <a:cs typeface="Consolas" pitchFamily="49" charset="0"/>
               </a:rPr>
-              <a:t>function print() {console.log('Hello')};</a:t>
+              <a:t>function print() </a:t>
+            </a:r>
+            <a:r>
+              <a:rPr lang="en-US" sz="1800" b="1" noProof="1" smtClean="0">
+                <a:solidFill>
+                  <a:srgbClr val="8CF4F2"/>
+                </a:solidFill>
+                <a:effectLst>
+                  <a:outerShdw blurRad="38100" dist="38100" dir="2700000" algn="tl">
+                    <a:srgbClr val="000000">
+                      <a:alpha val="43137"/>
+                    </a:srgbClr>
+                  </a:outerShdw>
+                </a:effectLst>
+                <a:latin typeface="Consolas" pitchFamily="49" charset="0"/>
+                <a:cs typeface="Consolas" pitchFamily="49" charset="0"/>
+              </a:rPr>
+              <a:t>{ console.log</a:t>
+            </a:r>
+            <a:r>
+              <a:rPr lang="en-US" sz="1800" b="1" noProof="1" smtClean="0">
+                <a:solidFill>
+                  <a:srgbClr val="8CF4F2"/>
+                </a:solidFill>
+                <a:effectLst>
+                  <a:outerShdw blurRad="38100" dist="38100" dir="2700000" algn="tl">
+                    <a:srgbClr val="000000">
+                      <a:alpha val="43137"/>
+                    </a:srgbClr>
+                  </a:outerShdw>
+                </a:effectLst>
+                <a:latin typeface="Consolas" pitchFamily="49" charset="0"/>
+                <a:cs typeface="Consolas" pitchFamily="49" charset="0"/>
+              </a:rPr>
+              <a:t>('Hello</a:t>
+            </a:r>
+            <a:r>
+              <a:rPr lang="en-US" sz="1800" b="1" noProof="1" smtClean="0">
+                <a:solidFill>
+                  <a:srgbClr val="8CF4F2"/>
+                </a:solidFill>
+                <a:effectLst>
+                  <a:outerShdw blurRad="38100" dist="38100" dir="2700000" algn="tl">
+                    <a:srgbClr val="000000">
+                      <a:alpha val="43137"/>
+                    </a:srgbClr>
+                  </a:outerShdw>
+                </a:effectLst>
+                <a:latin typeface="Consolas" pitchFamily="49" charset="0"/>
+                <a:cs typeface="Consolas" pitchFamily="49" charset="0"/>
+              </a:rPr>
+              <a:t>') };</a:t>
             </a:r>
             <a:endParaRPr lang="en-US" sz="1800" b="1" noProof="1">
               <a:solidFill>
@@ -8700,8 +8836,73 @@
                 <a:latin typeface="Consolas" pitchFamily="49" charset="0"/>
                 <a:cs typeface="Consolas" pitchFamily="49" charset="0"/>
               </a:rPr>
-              <a:t>var print = function() {console.log('Hello')};</a:t>
-            </a:r>
+              <a:t>var print = function() </a:t>
+            </a:r>
+            <a:r>
+              <a:rPr lang="en-US" sz="1800" b="1" noProof="1" smtClean="0">
+                <a:solidFill>
+                  <a:srgbClr val="8CF4F2"/>
+                </a:solidFill>
+                <a:effectLst>
+                  <a:outerShdw blurRad="38100" dist="38100" dir="2700000" algn="tl">
+                    <a:srgbClr val="000000">
+                      <a:alpha val="43137"/>
+                    </a:srgbClr>
+                  </a:outerShdw>
+                </a:effectLst>
+                <a:latin typeface="Consolas" pitchFamily="49" charset="0"/>
+                <a:cs typeface="Consolas" pitchFamily="49" charset="0"/>
+              </a:rPr>
+              <a:t>{ console.log</a:t>
+            </a:r>
+            <a:r>
+              <a:rPr lang="en-US" sz="1800" b="1" noProof="1" smtClean="0">
+                <a:solidFill>
+                  <a:srgbClr val="8CF4F2"/>
+                </a:solidFill>
+                <a:effectLst>
+                  <a:outerShdw blurRad="38100" dist="38100" dir="2700000" algn="tl">
+                    <a:srgbClr val="000000">
+                      <a:alpha val="43137"/>
+                    </a:srgbClr>
+                  </a:outerShdw>
+                </a:effectLst>
+                <a:latin typeface="Consolas" pitchFamily="49" charset="0"/>
+                <a:cs typeface="Consolas" pitchFamily="49" charset="0"/>
+              </a:rPr>
+              <a:t>('Hello</a:t>
+            </a:r>
+            <a:r>
+              <a:rPr lang="en-US" sz="1800" b="1" noProof="1" smtClean="0">
+                <a:solidFill>
+                  <a:srgbClr val="8CF4F2"/>
+                </a:solidFill>
+                <a:effectLst>
+                  <a:outerShdw blurRad="38100" dist="38100" dir="2700000" algn="tl">
+                    <a:srgbClr val="000000">
+                      <a:alpha val="43137"/>
+                    </a:srgbClr>
+                  </a:outerShdw>
+                </a:effectLst>
+                <a:latin typeface="Consolas" pitchFamily="49" charset="0"/>
+                <a:cs typeface="Consolas" pitchFamily="49" charset="0"/>
+              </a:rPr>
+              <a:t>') };</a:t>
+            </a:r>
+            <a:endParaRPr lang="en-US" sz="1800" b="1" noProof="1" smtClean="0">
+              <a:solidFill>
+                <a:srgbClr val="8CF4F2"/>
+              </a:solidFill>
+              <a:effectLst>
+                <a:outerShdw blurRad="38100" dist="38100" dir="2700000" algn="tl">
+                  <a:srgbClr val="000000">
+                    <a:alpha val="43137"/>
+                  </a:srgbClr>
+                </a:outerShdw>
+              </a:effectLst>
+              <a:latin typeface="Consolas" pitchFamily="49" charset="0"/>
+              <a:cs typeface="Consolas" pitchFamily="49" charset="0"/>
+            </a:endParaRPr>
           </a:p>
           <a:p>
             <a:pPr eaLnBrk="0" hangingPunct="0">
@@ -8731,7 +8932,7 @@
                 <a:latin typeface="Consolas" pitchFamily="49" charset="0"/>
                 <a:cs typeface="Consolas" pitchFamily="49" charset="0"/>
               </a:rPr>
-              <a:t>var print = function printFunc() {console.log('Hello</a:t>
+              <a:t>var print = function printFunc() </a:t>
             </a:r>
             <a:r>
               <a:rPr lang="en-US" b="1" noProof="1" smtClean="0">
@@ -8748,7 +8949,41 @@
                 <a:latin typeface="Consolas" pitchFamily="49" charset="0"/>
                 <a:cs typeface="Consolas" pitchFamily="49" charset="0"/>
               </a:rPr>
-              <a:t>')};</a:t>
+              <a:t>{ console.log</a:t>
+            </a:r>
+            <a:r>
+              <a:rPr lang="en-US" b="1" noProof="1">
+                <a:solidFill>
+                  <a:srgbClr val="8CF4F2"/>
+                </a:solidFill>
+                <a:effectLst>
+                  <a:outerShdw blurRad="38100" dist="38100" dir="2700000" algn="tl">
+                    <a:srgbClr val="000000">
+                      <a:alpha val="43137"/>
+                    </a:srgbClr>
+                  </a:outerShdw>
+                </a:effectLst>
+                <a:latin typeface="Consolas" pitchFamily="49" charset="0"/>
+                <a:cs typeface="Consolas" pitchFamily="49" charset="0"/>
+              </a:rPr>
+              <a:t>('Hello</a:t>
+            </a:r>
+            <a:r>
+              <a:rPr lang="en-US" b="1" noProof="1" smtClean="0">
+                <a:solidFill>
+                  <a:srgbClr val="8CF4F2"/>
+                </a:solidFill>
+                <a:effectLst>
+                  <a:outerShdw blurRad="38100" dist="38100" dir="2700000" algn="tl">
+                    <a:srgbClr val="000000">
+                      <a:alpha val="43137"/>
+                    </a:srgbClr>
+                  </a:outerShdw>
+                </a:effectLst>
+                <a:latin typeface="Consolas" pitchFamily="49" charset="0"/>
+                <a:cs typeface="Consolas" pitchFamily="49" charset="0"/>
+              </a:rPr>
+              <a:t>') };</a:t>
             </a:r>
             <a:endParaRPr lang="en-US" sz="1800" b="1" noProof="1">
               <a:solidFill>
@@ -9625,8 +9860,73 @@
                 <a:latin typeface="Consolas" pitchFamily="49" charset="0"/>
                 <a:cs typeface="Consolas" pitchFamily="49" charset="0"/>
               </a:rPr>
-              <a:t>   console.log("printed");</a:t>
-            </a:r>
+              <a:t>   </a:t>
+            </a:r>
+            <a:r>
+              <a:rPr lang="en-US" sz="1800" b="1" noProof="1" smtClean="0">
+                <a:solidFill>
+                  <a:srgbClr val="8CF4F2"/>
+                </a:solidFill>
+                <a:effectLst>
+                  <a:outerShdw blurRad="38100" dist="38100" dir="2700000" algn="tl">
+                    <a:srgbClr val="000000">
+                      <a:alpha val="43137"/>
+                    </a:srgbClr>
+                  </a:outerShdw>
+                </a:effectLst>
+                <a:latin typeface="Consolas" pitchFamily="49" charset="0"/>
+                <a:cs typeface="Consolas" pitchFamily="49" charset="0"/>
+              </a:rPr>
+              <a:t>console.log('printed</a:t>
+            </a:r>
+            <a:r>
+              <a:rPr lang="en-US" b="1" noProof="1">
+                <a:solidFill>
+                  <a:srgbClr val="8CF4F2"/>
+                </a:solidFill>
+                <a:effectLst>
+                  <a:outerShdw blurRad="38100" dist="38100" dir="2700000" algn="tl">
+                    <a:srgbClr val="000000">
+                      <a:alpha val="43137"/>
+                    </a:srgbClr>
+                  </a:outerShdw>
+                </a:effectLst>
+                <a:latin typeface="Consolas" pitchFamily="49" charset="0"/>
+                <a:cs typeface="Consolas" pitchFamily="49" charset="0"/>
+              </a:rPr>
+              <a:t>'</a:t>
+            </a:r>
+            <a:r>
+              <a:rPr lang="en-US" sz="1800" b="1" noProof="1" smtClean="0">
+                <a:solidFill>
+                  <a:srgbClr val="8CF4F2"/>
+                </a:solidFill>
+                <a:effectLst>
+                  <a:outerShdw blurRad="38100" dist="38100" dir="2700000" algn="tl">
+                    <a:srgbClr val="000000">
+                      <a:alpha val="43137"/>
+                    </a:srgbClr>
+                  </a:outerShdw>
+                </a:effectLst>
+                <a:latin typeface="Consolas" pitchFamily="49" charset="0"/>
+                <a:cs typeface="Consolas" pitchFamily="49" charset="0"/>
+              </a:rPr>
+              <a:t>);</a:t>
+            </a:r>
+            <a:endParaRPr lang="en-US" sz="1800" b="1" noProof="1" smtClean="0">
+              <a:solidFill>
+                <a:srgbClr val="8CF4F2"/>
+              </a:solidFill>
+              <a:effectLst>
+                <a:outerShdw blurRad="38100" dist="38100" dir="2700000" algn="tl">
+                  <a:srgbClr val="000000">
+                    <a:alpha val="43137"/>
+                  </a:srgbClr>
+                </a:outerShdw>
+              </a:effectLst>
+              <a:latin typeface="Consolas" pitchFamily="49" charset="0"/>
+              <a:cs typeface="Consolas" pitchFamily="49" charset="0"/>
+            </a:endParaRPr>
           </a:p>
           <a:p>
             <a:pPr eaLnBrk="0" hangingPunct="0">
@@ -11069,8 +11369,39 @@
                 <a:latin typeface="Consolas" pitchFamily="49" charset="0"/>
                 <a:cs typeface="Consolas" pitchFamily="49" charset="0"/>
               </a:rPr>
-              <a:t>        console.log("Positive");</a:t>
-            </a:r>
+              <a:t>        </a:t>
+            </a:r>
+            <a:r>
+              <a:rPr lang="en-US" b="1" noProof="1">
+                <a:solidFill>
+                  <a:srgbClr val="8CF4F2"/>
+                </a:solidFill>
+                <a:effectLst>
+                  <a:outerShdw blurRad="38100" dist="38100" dir="2700000" algn="tl">
+                    <a:srgbClr val="000000">
+                      <a:alpha val="43137"/>
+                    </a:srgbClr>
+                  </a:outerShdw>
+                </a:effectLst>
+                <a:latin typeface="Consolas" pitchFamily="49" charset="0"/>
+                <a:cs typeface="Consolas" pitchFamily="49" charset="0"/>
+              </a:rPr>
+              <a:t>console.log('Positive');</a:t>
+            </a:r>
+            <a:endParaRPr lang="en-US" sz="1800" b="1" noProof="1" smtClean="0">
+              <a:solidFill>
+                <a:srgbClr val="8CF4F2"/>
+              </a:solidFill>
+              <a:effectLst>
+                <a:outerShdw blurRad="38100" dist="38100" dir="2700000" algn="tl">
+                  <a:srgbClr val="000000">
+                    <a:alpha val="43137"/>
+                  </a:srgbClr>
+                </a:outerShdw>
+              </a:effectLst>
+              <a:latin typeface="Consolas" pitchFamily="49" charset="0"/>
+              <a:cs typeface="Consolas" pitchFamily="49" charset="0"/>
+            </a:endParaRPr>
           </a:p>
           <a:p>
             <a:pPr eaLnBrk="0" hangingPunct="0">
@@ -11137,8 +11468,73 @@
                 <a:latin typeface="Consolas" pitchFamily="49" charset="0"/>
                 <a:cs typeface="Consolas" pitchFamily="49" charset="0"/>
               </a:rPr>
-              <a:t>        console.log("Negative");</a:t>
-            </a:r>
+              <a:t>        console.log</a:t>
+            </a:r>
+            <a:r>
+              <a:rPr lang="en-US" b="1" noProof="1">
+                <a:solidFill>
+                  <a:srgbClr val="8CF4F2"/>
+                </a:solidFill>
+                <a:effectLst>
+                  <a:outerShdw blurRad="38100" dist="38100" dir="2700000" algn="tl">
+                    <a:srgbClr val="000000">
+                      <a:alpha val="43137"/>
+                    </a:srgbClr>
+                  </a:outerShdw>
+                </a:effectLst>
+                <a:latin typeface="Consolas" pitchFamily="49" charset="0"/>
+                <a:cs typeface="Consolas" pitchFamily="49" charset="0"/>
+              </a:rPr>
+              <a:t>(</a:t>
+            </a:r>
+            <a:r>
+              <a:rPr lang="en-US" b="1" noProof="1" smtClean="0">
+                <a:solidFill>
+                  <a:srgbClr val="8CF4F2"/>
+                </a:solidFill>
+                <a:effectLst>
+                  <a:outerShdw blurRad="38100" dist="38100" dir="2700000" algn="tl">
+                    <a:srgbClr val="000000">
+                      <a:alpha val="43137"/>
+                    </a:srgbClr>
+                  </a:outerShdw>
+                </a:effectLst>
+                <a:latin typeface="Consolas" pitchFamily="49" charset="0"/>
+                <a:cs typeface="Consolas" pitchFamily="49" charset="0"/>
+              </a:rPr>
+              <a:t>'Negative</a:t>
+            </a:r>
+            <a:r>
+              <a:rPr lang="en-US" b="1" noProof="1">
+                <a:solidFill>
+                  <a:srgbClr val="8CF4F2"/>
+                </a:solidFill>
+                <a:effectLst>
+                  <a:outerShdw blurRad="38100" dist="38100" dir="2700000" algn="tl">
+                    <a:srgbClr val="000000">
+                      <a:alpha val="43137"/>
+                    </a:srgbClr>
+                  </a:outerShdw>
+                </a:effectLst>
+                <a:latin typeface="Consolas" pitchFamily="49" charset="0"/>
+                <a:cs typeface="Consolas" pitchFamily="49" charset="0"/>
+              </a:rPr>
+              <a:t>');</a:t>
+            </a:r>
+            <a:endParaRPr lang="en-US" sz="1800" b="1" noProof="1" smtClean="0">
+              <a:solidFill>
+                <a:srgbClr val="8CF4F2"/>
+              </a:solidFill>
+              <a:effectLst>
+                <a:outerShdw blurRad="38100" dist="38100" dir="2700000" algn="tl">
+                  <a:srgbClr val="000000">
+                    <a:alpha val="43137"/>
+                  </a:srgbClr>
+                </a:outerShdw>
+              </a:effectLst>
+              <a:latin typeface="Consolas" pitchFamily="49" charset="0"/>
+              <a:cs typeface="Consolas" pitchFamily="49" charset="0"/>
+            </a:endParaRPr>
           </a:p>
           <a:p>
             <a:pPr eaLnBrk="0" hangingPunct="0">
@@ -11205,8 +11601,73 @@
                 <a:latin typeface="Consolas" pitchFamily="49" charset="0"/>
                 <a:cs typeface="Consolas" pitchFamily="49" charset="0"/>
               </a:rPr>
-              <a:t>        console.log("Zero");</a:t>
-            </a:r>
+              <a:t>        console.log</a:t>
+            </a:r>
+            <a:r>
+              <a:rPr lang="en-US" b="1" noProof="1">
+                <a:solidFill>
+                  <a:srgbClr val="8CF4F2"/>
+                </a:solidFill>
+                <a:effectLst>
+                  <a:outerShdw blurRad="38100" dist="38100" dir="2700000" algn="tl">
+                    <a:srgbClr val="000000">
+                      <a:alpha val="43137"/>
+                    </a:srgbClr>
+                  </a:outerShdw>
+                </a:effectLst>
+                <a:latin typeface="Consolas" pitchFamily="49" charset="0"/>
+                <a:cs typeface="Consolas" pitchFamily="49" charset="0"/>
+              </a:rPr>
+              <a:t>(</a:t>
+            </a:r>
+            <a:r>
+              <a:rPr lang="en-US" b="1" noProof="1" smtClean="0">
+                <a:solidFill>
+                  <a:srgbClr val="8CF4F2"/>
+                </a:solidFill>
+                <a:effectLst>
+                  <a:outerShdw blurRad="38100" dist="38100" dir="2700000" algn="tl">
+                    <a:srgbClr val="000000">
+                      <a:alpha val="43137"/>
+                    </a:srgbClr>
+                  </a:outerShdw>
+                </a:effectLst>
+                <a:latin typeface="Consolas" pitchFamily="49" charset="0"/>
+                <a:cs typeface="Consolas" pitchFamily="49" charset="0"/>
+              </a:rPr>
+              <a:t>'Zero</a:t>
+            </a:r>
+            <a:r>
+              <a:rPr lang="en-US" b="1" noProof="1">
+                <a:solidFill>
+                  <a:srgbClr val="8CF4F2"/>
+                </a:solidFill>
+                <a:effectLst>
+                  <a:outerShdw blurRad="38100" dist="38100" dir="2700000" algn="tl">
+                    <a:srgbClr val="000000">
+                      <a:alpha val="43137"/>
+                    </a:srgbClr>
+                  </a:outerShdw>
+                </a:effectLst>
+                <a:latin typeface="Consolas" pitchFamily="49" charset="0"/>
+                <a:cs typeface="Consolas" pitchFamily="49" charset="0"/>
+              </a:rPr>
+              <a:t>');</a:t>
+            </a:r>
+            <a:endParaRPr lang="en-US" sz="1800" b="1" noProof="1" smtClean="0">
+              <a:solidFill>
+                <a:srgbClr val="8CF4F2"/>
+              </a:solidFill>
+              <a:effectLst>
+                <a:outerShdw blurRad="38100" dist="38100" dir="2700000" algn="tl">
+                  <a:srgbClr val="000000">
+                    <a:alpha val="43137"/>
+                  </a:srgbClr>
+                </a:outerShdw>
+              </a:effectLst>
+              <a:latin typeface="Consolas" pitchFamily="49" charset="0"/>
+              <a:cs typeface="Consolas" pitchFamily="49" charset="0"/>
+            </a:endParaRPr>
           </a:p>
           <a:p>
             <a:pPr eaLnBrk="0" hangingPunct="0">
@@ -11488,8 +11949,39 @@
                 <a:latin typeface="Consolas" pitchFamily="49" charset="0"/>
                 <a:cs typeface="Consolas" pitchFamily="49" charset="0"/>
               </a:rPr>
-              <a:t>function printMax(number1, number2){</a:t>
-            </a:r>
+              <a:t>function printMax(number1, number2</a:t>
+            </a:r>
+            <a:r>
+              <a:rPr lang="en-US" sz="1800" b="1" noProof="1" smtClean="0">
+                <a:solidFill>
+                  <a:srgbClr val="8CF4F2"/>
+                </a:solidFill>
+                <a:effectLst>
+                  <a:outerShdw blurRad="38100" dist="38100" dir="2700000" algn="tl">
+                    <a:srgbClr val="000000">
+                      <a:alpha val="43137"/>
+                    </a:srgbClr>
+                  </a:outerShdw>
+                </a:effectLst>
+                <a:latin typeface="Consolas" pitchFamily="49" charset="0"/>
+                <a:cs typeface="Consolas" pitchFamily="49" charset="0"/>
+              </a:rPr>
+              <a:t>) {</a:t>
+            </a:r>
+            <a:endParaRPr lang="en-US" sz="1800" b="1" noProof="1" smtClean="0">
+              <a:solidFill>
+                <a:srgbClr val="8CF4F2"/>
+              </a:solidFill>
+              <a:effectLst>
+                <a:outerShdw blurRad="38100" dist="38100" dir="2700000" algn="tl">
+                  <a:srgbClr val="000000">
+                    <a:alpha val="43137"/>
+                  </a:srgbClr>
+                </a:outerShdw>
+              </a:effectLst>
+              <a:latin typeface="Consolas" pitchFamily="49" charset="0"/>
+              <a:cs typeface="Consolas" pitchFamily="49" charset="0"/>
+            </a:endParaRPr>
           </a:p>
           <a:p>
             <a:pPr eaLnBrk="0" hangingPunct="0">
@@ -11672,7 +12164,75 @@
                 <a:latin typeface="Consolas" pitchFamily="49" charset="0"/>
                 <a:cs typeface="Consolas" pitchFamily="49" charset="0"/>
               </a:rPr>
-              <a:t>console.log("Maximal number: " + max);</a:t>
+              <a:t>console.log</a:t>
+            </a:r>
+            <a:r>
+              <a:rPr lang="en-US" b="1" noProof="1">
+                <a:solidFill>
+                  <a:srgbClr val="8CF4F2"/>
+                </a:solidFill>
+                <a:effectLst>
+                  <a:outerShdw blurRad="38100" dist="38100" dir="2700000" algn="tl">
+                    <a:srgbClr val="000000">
+                      <a:alpha val="43137"/>
+                    </a:srgbClr>
+                  </a:outerShdw>
+                </a:effectLst>
+                <a:latin typeface="Consolas" pitchFamily="49" charset="0"/>
+                <a:cs typeface="Consolas" pitchFamily="49" charset="0"/>
+              </a:rPr>
+              <a:t>('Maximal </a:t>
+            </a:r>
+            <a:r>
+              <a:rPr lang="en-US" sz="1800" b="1" noProof="1" smtClean="0">
+                <a:solidFill>
+                  <a:srgbClr val="8CF4F2"/>
+                </a:solidFill>
+                <a:effectLst>
+                  <a:outerShdw blurRad="38100" dist="38100" dir="2700000" algn="tl">
+                    <a:srgbClr val="000000">
+                      <a:alpha val="43137"/>
+                    </a:srgbClr>
+                  </a:outerShdw>
+                </a:effectLst>
+                <a:latin typeface="Consolas" pitchFamily="49" charset="0"/>
+                <a:cs typeface="Consolas" pitchFamily="49" charset="0"/>
+              </a:rPr>
+              <a:t>number: </a:t>
+            </a:r>
+            <a:r>
+              <a:rPr lang="en-US" b="1" noProof="1">
+                <a:solidFill>
+                  <a:srgbClr val="8CF4F2"/>
+                </a:solidFill>
+                <a:effectLst>
+                  <a:outerShdw blurRad="38100" dist="38100" dir="2700000" algn="tl">
+                    <a:srgbClr val="000000">
+                      <a:alpha val="43137"/>
+                    </a:srgbClr>
+                  </a:outerShdw>
+                </a:effectLst>
+                <a:latin typeface="Consolas" pitchFamily="49" charset="0"/>
+                <a:cs typeface="Consolas" pitchFamily="49" charset="0"/>
+              </a:rPr>
+              <a:t>' </a:t>
+            </a:r>
+            <a:r>
+              <a:rPr lang="en-US" sz="1800" b="1" noProof="1" smtClean="0">
+                <a:solidFill>
+                  <a:srgbClr val="8CF4F2"/>
+                </a:solidFill>
+                <a:effectLst>
+                  <a:outerShdw blurRad="38100" dist="38100" dir="2700000" algn="tl">
+                    <a:srgbClr val="000000">
+                      <a:alpha val="43137"/>
+                    </a:srgbClr>
+                  </a:outerShdw>
+                </a:effectLst>
+                <a:latin typeface="Consolas" pitchFamily="49" charset="0"/>
+                <a:cs typeface="Consolas" pitchFamily="49" charset="0"/>
+              </a:rPr>
+              <a:t>+ max);</a:t>
             </a:r>
             <a:endParaRPr lang="en-US" sz="1800" b="1" noProof="1">
               <a:solidFill>
@@ -12063,7 +12623,7 @@
                 <a:latin typeface="Consolas" pitchFamily="49" charset="0"/>
                 <a:cs typeface="Consolas" pitchFamily="49" charset="0"/>
               </a:rPr>
-              <a:t>printSign(2+3</a:t>
+              <a:t>printSign(2 + 3</a:t>
             </a:r>
             <a:r>
               <a:rPr lang="en-US" sz="2000" b="1" noProof="1">
@@ -12511,7 +13071,24 @@
                 <a:latin typeface="Consolas" pitchFamily="49" charset="0"/>
                 <a:cs typeface="Consolas" pitchFamily="49" charset="0"/>
               </a:rPr>
-              <a:t>function printSign(number){</a:t>
+              <a:t>function printSign(number</a:t>
+            </a:r>
+            <a:r>
+              <a:rPr lang="en-US" sz="1800" b="1" noProof="1" smtClean="0">
+                <a:solidFill>
+                  <a:srgbClr val="8CF4F2"/>
+                </a:solidFill>
+                <a:effectLst>
+                  <a:outerShdw blurRad="38100" dist="38100" dir="2700000" algn="tl">
+                    <a:srgbClr val="000000">
+                      <a:alpha val="43137"/>
+                    </a:srgbClr>
+                  </a:outerShdw>
+                </a:effectLst>
+                <a:latin typeface="Consolas" pitchFamily="49" charset="0"/>
+                <a:cs typeface="Consolas" pitchFamily="49" charset="0"/>
+              </a:rPr>
+              <a:t>) {</a:t>
             </a:r>
             <a:endParaRPr lang="en-US" sz="1800" b="1" noProof="1">
               <a:solidFill>
@@ -12627,7 +13204,24 @@
                 <a:latin typeface="Consolas" pitchFamily="49" charset="0"/>
                 <a:cs typeface="Consolas" pitchFamily="49" charset="0"/>
               </a:rPr>
-              <a:t>  console.log("</a:t>
+              <a:t>  console.log</a:t>
+            </a:r>
+            <a:r>
+              <a:rPr lang="en-US" b="1" noProof="1">
+                <a:solidFill>
+                  <a:srgbClr val="8CF4F2"/>
+                </a:solidFill>
+                <a:effectLst>
+                  <a:outerShdw blurRad="38100" dist="38100" dir="2700000" algn="tl">
+                    <a:srgbClr val="000000">
+                      <a:alpha val="43137"/>
+                    </a:srgbClr>
+                  </a:outerShdw>
+                </a:effectLst>
+                <a:latin typeface="Consolas" pitchFamily="49" charset="0"/>
+                <a:cs typeface="Consolas" pitchFamily="49" charset="0"/>
+              </a:rPr>
+              <a:t>('The </a:t>
             </a:r>
             <a:r>
               <a:rPr lang="en-US" sz="1800" b="1" noProof="1">
@@ -12644,7 +13238,24 @@
                 <a:latin typeface="Consolas" pitchFamily="49" charset="0"/>
                 <a:cs typeface="Consolas" pitchFamily="49" charset="0"/>
               </a:rPr>
-              <a:t>The number </a:t>
+              <a:t>number </a:t>
+            </a:r>
+            <a:r>
+              <a:rPr lang="en-US" b="1" noProof="1">
+                <a:solidFill>
+                  <a:srgbClr val="8CF4F2"/>
+                </a:solidFill>
+                <a:effectLst>
+                  <a:outerShdw blurRad="38100" dist="38100" dir="2700000" algn="tl">
+                    <a:srgbClr val="000000">
+                      <a:alpha val="43137"/>
+                    </a:srgbClr>
+                  </a:outerShdw>
+                </a:effectLst>
+                <a:latin typeface="Consolas" pitchFamily="49" charset="0"/>
+                <a:cs typeface="Consolas" pitchFamily="49" charset="0"/>
+              </a:rPr>
+              <a:t>' </a:t>
             </a:r>
             <a:r>
               <a:rPr lang="en-US" sz="1800" b="1" noProof="1" smtClean="0">
@@ -12661,7 +13272,41 @@
                 <a:latin typeface="Consolas" pitchFamily="49" charset="0"/>
                 <a:cs typeface="Consolas" pitchFamily="49" charset="0"/>
               </a:rPr>
-              <a:t>" + number + " is</a:t>
+              <a:t>+ number + </a:t>
+            </a:r>
+            <a:r>
+              <a:rPr lang="en-US" b="1" noProof="1">
+                <a:solidFill>
+                  <a:srgbClr val="8CF4F2"/>
+                </a:solidFill>
+                <a:effectLst>
+                  <a:outerShdw blurRad="38100" dist="38100" dir="2700000" algn="tl">
+                    <a:srgbClr val="000000">
+                      <a:alpha val="43137"/>
+                    </a:srgbClr>
+                  </a:outerShdw>
+                </a:effectLst>
+                <a:latin typeface="Consolas" pitchFamily="49" charset="0"/>
+                <a:cs typeface="Consolas" pitchFamily="49" charset="0"/>
+              </a:rPr>
+              <a:t>' </a:t>
+            </a:r>
+            <a:r>
+              <a:rPr lang="en-US" sz="1800" b="1" noProof="1" smtClean="0">
+                <a:solidFill>
+                  <a:srgbClr val="8CF4F2"/>
+                </a:solidFill>
+                <a:effectLst>
+                  <a:outerShdw blurRad="38100" dist="38100" dir="2700000" algn="tl">
+                    <a:srgbClr val="000000">
+                      <a:alpha val="43137"/>
+                    </a:srgbClr>
+                  </a:outerShdw>
+                </a:effectLst>
+                <a:latin typeface="Consolas" pitchFamily="49" charset="0"/>
+                <a:cs typeface="Consolas" pitchFamily="49" charset="0"/>
+              </a:rPr>
+              <a:t>is</a:t>
             </a:r>
             <a:r>
               <a:rPr lang="bg-BG" sz="1800" b="1" noProof="1" smtClean="0">
@@ -12695,7 +13340,24 @@
                 <a:latin typeface="Consolas" pitchFamily="49" charset="0"/>
                 <a:cs typeface="Consolas" pitchFamily="49" charset="0"/>
               </a:rPr>
-              <a:t>positive.");</a:t>
+              <a:t>positive</a:t>
+            </a:r>
+            <a:r>
+              <a:rPr lang="en-US" b="1" noProof="1" smtClean="0">
+                <a:solidFill>
+                  <a:srgbClr val="8CF4F2"/>
+                </a:solidFill>
+                <a:effectLst>
+                  <a:outerShdw blurRad="38100" dist="38100" dir="2700000" algn="tl">
+                    <a:srgbClr val="000000">
+                      <a:alpha val="43137"/>
+                    </a:srgbClr>
+                  </a:outerShdw>
+                </a:effectLst>
+                <a:latin typeface="Consolas" pitchFamily="49" charset="0"/>
+                <a:cs typeface="Consolas" pitchFamily="49" charset="0"/>
+              </a:rPr>
+              <a:t>.');</a:t>
             </a:r>
             <a:endParaRPr lang="en-US" sz="1800" b="1" noProof="1">
               <a:solidFill>
@@ -12811,7 +13473,24 @@
                 <a:latin typeface="Consolas" pitchFamily="49" charset="0"/>
                 <a:cs typeface="Consolas" pitchFamily="49" charset="0"/>
               </a:rPr>
-              <a:t>console.log("</a:t>
+              <a:t>console.log</a:t>
+            </a:r>
+            <a:r>
+              <a:rPr lang="en-US" b="1" noProof="1">
+                <a:solidFill>
+                  <a:srgbClr val="8CF4F2"/>
+                </a:solidFill>
+                <a:effectLst>
+                  <a:outerShdw blurRad="38100" dist="38100" dir="2700000" algn="tl">
+                    <a:srgbClr val="000000">
+                      <a:alpha val="43137"/>
+                    </a:srgbClr>
+                  </a:outerShdw>
+                </a:effectLst>
+                <a:latin typeface="Consolas" pitchFamily="49" charset="0"/>
+                <a:cs typeface="Consolas" pitchFamily="49" charset="0"/>
+              </a:rPr>
+              <a:t>('The </a:t>
             </a:r>
             <a:r>
               <a:rPr lang="en-US" sz="1800" b="1" noProof="1">
@@ -12828,7 +13507,58 @@
                 <a:latin typeface="Consolas" pitchFamily="49" charset="0"/>
                 <a:cs typeface="Consolas" pitchFamily="49" charset="0"/>
               </a:rPr>
-              <a:t>The number " + number + " </a:t>
+              <a:t>number </a:t>
+            </a:r>
+            <a:r>
+              <a:rPr lang="en-US" b="1" noProof="1">
+                <a:solidFill>
+                  <a:srgbClr val="8CF4F2"/>
+                </a:solidFill>
+                <a:effectLst>
+                  <a:outerShdw blurRad="38100" dist="38100" dir="2700000" algn="tl">
+                    <a:srgbClr val="000000">
+                      <a:alpha val="43137"/>
+                    </a:srgbClr>
+                  </a:outerShdw>
+                </a:effectLst>
+                <a:latin typeface="Consolas" pitchFamily="49" charset="0"/>
+                <a:cs typeface="Consolas" pitchFamily="49" charset="0"/>
+              </a:rPr>
+              <a:t>' </a:t>
+            </a:r>
+            <a:r>
+              <a:rPr lang="en-US" sz="1800" b="1" noProof="1">
+                <a:solidFill>
+                  <a:srgbClr val="8CF4F2"/>
+                </a:solidFill>
+                <a:effectLst>
+                  <a:outerShdw blurRad="38100" dist="38100" dir="2700000" algn="tl">
+                    <a:srgbClr val="000000">
+                      <a:alpha val="43137"/>
+                    </a:srgbClr>
+                  </a:outerShdw>
+                </a:effectLst>
+                <a:latin typeface="Consolas" pitchFamily="49" charset="0"/>
+                <a:cs typeface="Consolas" pitchFamily="49" charset="0"/>
+              </a:rPr>
+              <a:t>+ number + </a:t>
+            </a:r>
+            <a:r>
+              <a:rPr lang="en-US" b="1" noProof="1">
+                <a:solidFill>
+                  <a:srgbClr val="8CF4F2"/>
+                </a:solidFill>
+                <a:effectLst>
+                  <a:outerShdw blurRad="38100" dist="38100" dir="2700000" algn="tl">
+                    <a:srgbClr val="000000">
+                      <a:alpha val="43137"/>
+                    </a:srgbClr>
+                  </a:outerShdw>
+                </a:effectLst>
+                <a:latin typeface="Consolas" pitchFamily="49" charset="0"/>
+                <a:cs typeface="Consolas" pitchFamily="49" charset="0"/>
+              </a:rPr>
+              <a:t>' </a:t>
             </a:r>
             <a:r>
               <a:rPr lang="en-US" sz="1800" b="1" noProof="1" smtClean="0">
@@ -12879,7 +13609,24 @@
                 <a:latin typeface="Consolas" pitchFamily="49" charset="0"/>
                 <a:cs typeface="Consolas" pitchFamily="49" charset="0"/>
               </a:rPr>
-              <a:t>negative.");</a:t>
+              <a:t>negative</a:t>
+            </a:r>
+            <a:r>
+              <a:rPr lang="en-US" b="1" noProof="1" smtClean="0">
+                <a:solidFill>
+                  <a:srgbClr val="8CF4F2"/>
+                </a:solidFill>
+                <a:effectLst>
+                  <a:outerShdw blurRad="38100" dist="38100" dir="2700000" algn="tl">
+                    <a:srgbClr val="000000">
+                      <a:alpha val="43137"/>
+                    </a:srgbClr>
+                  </a:outerShdw>
+                </a:effectLst>
+                <a:latin typeface="Consolas" pitchFamily="49" charset="0"/>
+                <a:cs typeface="Consolas" pitchFamily="49" charset="0"/>
+              </a:rPr>
+              <a:t>.');</a:t>
             </a:r>
             <a:endParaRPr lang="en-US" sz="1800" b="1" noProof="1">
               <a:solidFill>
@@ -12992,7 +13739,24 @@
                 <a:latin typeface="Consolas" pitchFamily="49" charset="0"/>
                 <a:cs typeface="Consolas" pitchFamily="49" charset="0"/>
               </a:rPr>
-              <a:t>console.log("</a:t>
+              <a:t>console.log</a:t>
+            </a:r>
+            <a:r>
+              <a:rPr lang="en-US" b="1" noProof="1">
+                <a:solidFill>
+                  <a:srgbClr val="8CF4F2"/>
+                </a:solidFill>
+                <a:effectLst>
+                  <a:outerShdw blurRad="38100" dist="38100" dir="2700000" algn="tl">
+                    <a:srgbClr val="000000">
+                      <a:alpha val="43137"/>
+                    </a:srgbClr>
+                  </a:outerShdw>
+                </a:effectLst>
+                <a:latin typeface="Consolas" pitchFamily="49" charset="0"/>
+                <a:cs typeface="Consolas" pitchFamily="49" charset="0"/>
+              </a:rPr>
+              <a:t>('The </a:t>
             </a:r>
             <a:r>
               <a:rPr lang="en-US" sz="1800" b="1" noProof="1">
@@ -13009,7 +13773,58 @@
                 <a:latin typeface="Consolas" pitchFamily="49" charset="0"/>
                 <a:cs typeface="Consolas" pitchFamily="49" charset="0"/>
               </a:rPr>
-              <a:t>The number " + number + " </a:t>
+              <a:t>number </a:t>
+            </a:r>
+            <a:r>
+              <a:rPr lang="en-US" b="1" noProof="1">
+                <a:solidFill>
+                  <a:srgbClr val="8CF4F2"/>
+                </a:solidFill>
+                <a:effectLst>
+                  <a:outerShdw blurRad="38100" dist="38100" dir="2700000" algn="tl">
+                    <a:srgbClr val="000000">
+                      <a:alpha val="43137"/>
+                    </a:srgbClr>
+                  </a:outerShdw>
+                </a:effectLst>
+                <a:latin typeface="Consolas" pitchFamily="49" charset="0"/>
+                <a:cs typeface="Consolas" pitchFamily="49" charset="0"/>
+              </a:rPr>
+              <a:t>' </a:t>
+            </a:r>
+            <a:r>
+              <a:rPr lang="en-US" sz="1800" b="1" noProof="1">
+                <a:solidFill>
+                  <a:srgbClr val="8CF4F2"/>
+                </a:solidFill>
+                <a:effectLst>
+                  <a:outerShdw blurRad="38100" dist="38100" dir="2700000" algn="tl">
+                    <a:srgbClr val="000000">
+                      <a:alpha val="43137"/>
+                    </a:srgbClr>
+                  </a:outerShdw>
+                </a:effectLst>
+                <a:latin typeface="Consolas" pitchFamily="49" charset="0"/>
+                <a:cs typeface="Consolas" pitchFamily="49" charset="0"/>
+              </a:rPr>
+              <a:t>+ number + </a:t>
+            </a:r>
+            <a:r>
+              <a:rPr lang="en-US" b="1" noProof="1">
+                <a:solidFill>
+                  <a:srgbClr val="8CF4F2"/>
+                </a:solidFill>
+                <a:effectLst>
+                  <a:outerShdw blurRad="38100" dist="38100" dir="2700000" algn="tl">
+                    <a:srgbClr val="000000">
+                      <a:alpha val="43137"/>
+                    </a:srgbClr>
+                  </a:outerShdw>
+                </a:effectLst>
+                <a:latin typeface="Consolas" pitchFamily="49" charset="0"/>
+                <a:cs typeface="Consolas" pitchFamily="49" charset="0"/>
+              </a:rPr>
+              <a:t>' </a:t>
             </a:r>
             <a:r>
               <a:rPr lang="en-US" sz="1800" b="1" noProof="1" smtClean="0">
@@ -13026,7 +13841,24 @@
                 <a:latin typeface="Consolas" pitchFamily="49" charset="0"/>
                 <a:cs typeface="Consolas" pitchFamily="49" charset="0"/>
               </a:rPr>
-              <a:t>is zero.");</a:t>
+              <a:t>is zero</a:t>
+            </a:r>
+            <a:r>
+              <a:rPr lang="en-US" b="1" noProof="1" smtClean="0">
+                <a:solidFill>
+                  <a:srgbClr val="8CF4F2"/>
+                </a:solidFill>
+                <a:effectLst>
+                  <a:outerShdw blurRad="38100" dist="38100" dir="2700000" algn="tl">
+                    <a:srgbClr val="000000">
+                      <a:alpha val="43137"/>
+                    </a:srgbClr>
+                  </a:outerShdw>
+                </a:effectLst>
+                <a:latin typeface="Consolas" pitchFamily="49" charset="0"/>
+                <a:cs typeface="Consolas" pitchFamily="49" charset="0"/>
+              </a:rPr>
+              <a:t>.');</a:t>
             </a:r>
             <a:endParaRPr lang="en-US" sz="1800" b="1" noProof="1">
               <a:solidFill>
@@ -13108,7 +13940,24 @@
                 <a:latin typeface="Consolas" pitchFamily="49" charset="0"/>
                 <a:cs typeface="Consolas" pitchFamily="49" charset="0"/>
               </a:rPr>
-              <a:t>function printMax(number1, number2){</a:t>
+              <a:t>function printMax(number1, number2</a:t>
+            </a:r>
+            <a:r>
+              <a:rPr lang="en-US" sz="1800" b="1" noProof="1" smtClean="0">
+                <a:solidFill>
+                  <a:srgbClr val="8CF4F2"/>
+                </a:solidFill>
+                <a:effectLst>
+                  <a:outerShdw blurRad="38100" dist="38100" dir="2700000" algn="tl">
+                    <a:srgbClr val="000000">
+                      <a:alpha val="43137"/>
+                    </a:srgbClr>
+                  </a:outerShdw>
+                </a:effectLst>
+                <a:latin typeface="Consolas" pitchFamily="49" charset="0"/>
+                <a:cs typeface="Consolas" pitchFamily="49" charset="0"/>
+              </a:rPr>
+              <a:t>) {</a:t>
             </a:r>
             <a:endParaRPr lang="en-US" sz="1800" b="1" noProof="1">
               <a:solidFill>
@@ -13241,7 +14090,7 @@
                 <a:latin typeface="Consolas" pitchFamily="49" charset="0"/>
                 <a:cs typeface="Consolas" pitchFamily="49" charset="0"/>
               </a:rPr>
-              <a:t>){</a:t>
+              <a:t>) {</a:t>
             </a:r>
             <a:endParaRPr lang="en-US" sz="1800" b="1" noProof="1">
               <a:solidFill>
@@ -13391,7 +14240,24 @@
                 <a:latin typeface="Consolas" pitchFamily="49" charset="0"/>
                 <a:cs typeface="Consolas" pitchFamily="49" charset="0"/>
               </a:rPr>
-              <a:t>  console.log("</a:t>
+              <a:t>  console.log</a:t>
+            </a:r>
+            <a:r>
+              <a:rPr lang="en-US" b="1" noProof="1">
+                <a:solidFill>
+                  <a:srgbClr val="8CF4F2"/>
+                </a:solidFill>
+                <a:effectLst>
+                  <a:outerShdw blurRad="38100" dist="38100" dir="2700000" algn="tl">
+                    <a:srgbClr val="000000">
+                      <a:alpha val="43137"/>
+                    </a:srgbClr>
+                  </a:outerShdw>
+                </a:effectLst>
+                <a:latin typeface="Consolas" pitchFamily="49" charset="0"/>
+                <a:cs typeface="Consolas" pitchFamily="49" charset="0"/>
+              </a:rPr>
+              <a:t>('Maximal </a:t>
             </a:r>
             <a:r>
               <a:rPr lang="en-US" sz="1800" b="1" noProof="1">
@@ -13408,7 +14274,24 @@
                 <a:latin typeface="Consolas" pitchFamily="49" charset="0"/>
                 <a:cs typeface="Consolas" pitchFamily="49" charset="0"/>
               </a:rPr>
-              <a:t>Maximal number: </a:t>
+              <a:t>number: </a:t>
+            </a:r>
+            <a:r>
+              <a:rPr lang="en-US" b="1" noProof="1">
+                <a:solidFill>
+                  <a:srgbClr val="8CF4F2"/>
+                </a:solidFill>
+                <a:effectLst>
+                  <a:outerShdw blurRad="38100" dist="38100" dir="2700000" algn="tl">
+                    <a:srgbClr val="000000">
+                      <a:alpha val="43137"/>
+                    </a:srgbClr>
+                  </a:outerShdw>
+                </a:effectLst>
+                <a:latin typeface="Consolas" pitchFamily="49" charset="0"/>
+                <a:cs typeface="Consolas" pitchFamily="49" charset="0"/>
+              </a:rPr>
+              <a:t>' </a:t>
             </a:r>
             <a:r>
               <a:rPr lang="en-US" sz="1800" b="1" noProof="1" smtClean="0">
@@ -13425,7 +14308,7 @@
                 <a:latin typeface="Consolas" pitchFamily="49" charset="0"/>
                 <a:cs typeface="Consolas" pitchFamily="49" charset="0"/>
               </a:rPr>
-              <a:t>" + </a:t>
+              <a:t>+ </a:t>
             </a:r>
             <a:r>
               <a:rPr lang="en-US" sz="1800" b="1" noProof="1">
@@ -14554,8 +15437,73 @@
                 <a:latin typeface="Consolas" pitchFamily="49" charset="0"/>
                 <a:cs typeface="Consolas" pitchFamily="49" charset="0"/>
               </a:rPr>
-              <a:t>read("input-tb");</a:t>
-            </a:r>
+              <a:t>read</a:t>
+            </a:r>
+            <a:r>
+              <a:rPr lang="en-US" b="1" noProof="1">
+                <a:solidFill>
+                  <a:srgbClr val="8CF4F2"/>
+                </a:solidFill>
+                <a:effectLst>
+                  <a:outerShdw blurRad="38100" dist="38100" dir="2700000" algn="tl">
+                    <a:srgbClr val="000000">
+                      <a:alpha val="43137"/>
+                    </a:srgbClr>
+                  </a:outerShdw>
+                </a:effectLst>
+                <a:latin typeface="Consolas" pitchFamily="49" charset="0"/>
+                <a:cs typeface="Consolas" pitchFamily="49" charset="0"/>
+              </a:rPr>
+              <a:t>(</a:t>
+            </a:r>
+            <a:r>
+              <a:rPr lang="en-US" b="1" noProof="1" smtClean="0">
+                <a:solidFill>
+                  <a:srgbClr val="8CF4F2"/>
+                </a:solidFill>
+                <a:effectLst>
+                  <a:outerShdw blurRad="38100" dist="38100" dir="2700000" algn="tl">
+                    <a:srgbClr val="000000">
+                      <a:alpha val="43137"/>
+                    </a:srgbClr>
+                  </a:outerShdw>
+                </a:effectLst>
+                <a:latin typeface="Consolas" pitchFamily="49" charset="0"/>
+                <a:cs typeface="Consolas" pitchFamily="49" charset="0"/>
+              </a:rPr>
+              <a:t>'input-tb</a:t>
+            </a:r>
+            <a:r>
+              <a:rPr lang="en-US" b="1" noProof="1">
+                <a:solidFill>
+                  <a:srgbClr val="8CF4F2"/>
+                </a:solidFill>
+                <a:effectLst>
+                  <a:outerShdw blurRad="38100" dist="38100" dir="2700000" algn="tl">
+                    <a:srgbClr val="000000">
+                      <a:alpha val="43137"/>
+                    </a:srgbClr>
+                  </a:outerShdw>
+                </a:effectLst>
+                <a:latin typeface="Consolas" pitchFamily="49" charset="0"/>
+                <a:cs typeface="Consolas" pitchFamily="49" charset="0"/>
+              </a:rPr>
+              <a:t>');</a:t>
+            </a:r>
+            <a:endParaRPr lang="en-US" sz="1800" b="1" noProof="1" smtClean="0">
+              <a:solidFill>
+                <a:srgbClr val="8CF4F2"/>
+              </a:solidFill>
+              <a:effectLst>
+                <a:outerShdw blurRad="38100" dist="38100" dir="2700000" algn="tl">
+                  <a:srgbClr val="000000">
+                    <a:alpha val="43137"/>
+                  </a:srgbClr>
+                </a:outerShdw>
+              </a:effectLst>
+              <a:latin typeface="Consolas" pitchFamily="49" charset="0"/>
+              <a:cs typeface="Consolas" pitchFamily="49" charset="0"/>
+            </a:endParaRPr>
           </a:p>
           <a:p>
             <a:pPr eaLnBrk="0" hangingPunct="0">
@@ -15083,8 +16031,39 @@
                 <a:latin typeface="Consolas" pitchFamily="49" charset="0"/>
                 <a:cs typeface="Consolas" pitchFamily="49" charset="0"/>
               </a:rPr>
-              <a:t>function printLine(start, end){</a:t>
-            </a:r>
+              <a:t>function printLine(start, end</a:t>
+            </a:r>
+            <a:r>
+              <a:rPr lang="en-US" sz="1800" b="1" noProof="1" smtClean="0">
+                <a:solidFill>
+                  <a:srgbClr val="8CF4F2"/>
+                </a:solidFill>
+                <a:effectLst>
+                  <a:outerShdw blurRad="38100" dist="38100" dir="2700000" algn="tl">
+                    <a:srgbClr val="000000">
+                      <a:alpha val="43137"/>
+                    </a:srgbClr>
+                  </a:outerShdw>
+                </a:effectLst>
+                <a:latin typeface="Consolas" pitchFamily="49" charset="0"/>
+                <a:cs typeface="Consolas" pitchFamily="49" charset="0"/>
+              </a:rPr>
+              <a:t>) {</a:t>
+            </a:r>
+            <a:endParaRPr lang="en-US" sz="1800" b="1" noProof="1" smtClean="0">
+              <a:solidFill>
+                <a:srgbClr val="8CF4F2"/>
+              </a:solidFill>
+              <a:effectLst>
+                <a:outerShdw blurRad="38100" dist="38100" dir="2700000" algn="tl">
+                  <a:srgbClr val="000000">
+                    <a:alpha val="43137"/>
+                  </a:srgbClr>
+                </a:outerShdw>
+              </a:effectLst>
+              <a:latin typeface="Consolas" pitchFamily="49" charset="0"/>
+              <a:cs typeface="Consolas" pitchFamily="49" charset="0"/>
+            </a:endParaRPr>
           </a:p>
           <a:p>
             <a:pPr eaLnBrk="0" hangingPunct="0">
@@ -15134,7 +16113,58 @@
                 <a:latin typeface="Consolas" pitchFamily="49" charset="0"/>
                 <a:cs typeface="Consolas" pitchFamily="49" charset="0"/>
               </a:rPr>
-              <a:t>  var line="";</a:t>
+              <a:t>  var line</a:t>
+            </a:r>
+            <a:r>
+              <a:rPr lang="en-US" b="1" noProof="1" smtClean="0">
+                <a:solidFill>
+                  <a:srgbClr val="8CF4F2"/>
+                </a:solidFill>
+                <a:effectLst>
+                  <a:outerShdw blurRad="38100" dist="38100" dir="2700000" algn="tl">
+                    <a:srgbClr val="000000">
+                      <a:alpha val="43137"/>
+                    </a:srgbClr>
+                  </a:outerShdw>
+                </a:effectLst>
+                <a:latin typeface="Consolas" pitchFamily="49" charset="0"/>
+                <a:cs typeface="Consolas" pitchFamily="49" charset="0"/>
+              </a:rPr>
+              <a:t>='</a:t>
+            </a:r>
+            <a:r>
+              <a:rPr lang="en-US" b="1" noProof="1">
+                <a:solidFill>
+                  <a:srgbClr val="8CF4F2"/>
+                </a:solidFill>
+                <a:effectLst>
+                  <a:outerShdw blurRad="38100" dist="38100" dir="2700000" algn="tl">
+                    <a:srgbClr val="000000">
+                      <a:alpha val="43137"/>
+                    </a:srgbClr>
+                  </a:outerShdw>
+                </a:effectLst>
+                <a:latin typeface="Consolas" pitchFamily="49" charset="0"/>
+                <a:cs typeface="Consolas" pitchFamily="49" charset="0"/>
+              </a:rPr>
+              <a:t>'</a:t>
+            </a:r>
+            <a:r>
+              <a:rPr lang="en-US" b="1" noProof="1" smtClean="0">
+                <a:solidFill>
+                  <a:srgbClr val="8CF4F2"/>
+                </a:solidFill>
+                <a:effectLst>
+                  <a:outerShdw blurRad="38100" dist="38100" dir="2700000" algn="tl">
+                    <a:srgbClr val="000000">
+                      <a:alpha val="43137"/>
+                    </a:srgbClr>
+                  </a:outerShdw>
+                </a:effectLst>
+                <a:latin typeface="Consolas" pitchFamily="49" charset="0"/>
+                <a:cs typeface="Consolas" pitchFamily="49" charset="0"/>
+              </a:rPr>
+              <a:t>;</a:t>
             </a:r>
             <a:endParaRPr lang="en-US" sz="1800" b="1" noProof="1">
               <a:solidFill>
@@ -15264,7 +16294,41 @@
                 <a:latin typeface="Consolas" pitchFamily="49" charset="0"/>
                 <a:cs typeface="Consolas" pitchFamily="49" charset="0"/>
               </a:rPr>
-              <a:t>      line += " " + i;</a:t>
+              <a:t>      line += </a:t>
+            </a:r>
+            <a:r>
+              <a:rPr lang="en-US" b="1" noProof="1">
+                <a:solidFill>
+                  <a:srgbClr val="8CF4F2"/>
+                </a:solidFill>
+                <a:effectLst>
+                  <a:outerShdw blurRad="38100" dist="38100" dir="2700000" algn="tl">
+                    <a:srgbClr val="000000">
+                      <a:alpha val="43137"/>
+                    </a:srgbClr>
+                  </a:outerShdw>
+                </a:effectLst>
+                <a:latin typeface="Consolas" pitchFamily="49" charset="0"/>
+                <a:cs typeface="Consolas" pitchFamily="49" charset="0"/>
+              </a:rPr>
+              <a:t>' ' </a:t>
+            </a:r>
+            <a:r>
+              <a:rPr lang="en-US" sz="1800" b="1" noProof="1" smtClean="0">
+                <a:solidFill>
+                  <a:srgbClr val="8CF4F2"/>
+                </a:solidFill>
+                <a:effectLst>
+                  <a:outerShdw blurRad="38100" dist="38100" dir="2700000" algn="tl">
+                    <a:srgbClr val="000000">
+                      <a:alpha val="43137"/>
+                    </a:srgbClr>
+                  </a:outerShdw>
+                </a:effectLst>
+                <a:latin typeface="Consolas" pitchFamily="49" charset="0"/>
+                <a:cs typeface="Consolas" pitchFamily="49" charset="0"/>
+              </a:rPr>
+              <a:t>+ i;</a:t>
             </a:r>
           </a:p>
           <a:p>
@@ -15448,7 +16512,7 @@
           </p:nvPr>
         </p:nvSpPr>
         <p:spPr>
-          <a:xfrm rot="21438155">
+          <a:xfrm>
             <a:off x="457200" y="4607267"/>
             <a:ext cx="8229600" cy="685800"/>
           </a:xfrm>
@@ -15476,7 +16540,7 @@
           </p:nvPr>
         </p:nvSpPr>
         <p:spPr>
-          <a:xfrm rot="21438155">
+          <a:xfrm>
             <a:off x="457200" y="5333546"/>
             <a:ext cx="8229600" cy="569120"/>
           </a:xfrm>
@@ -15898,8 +16962,39 @@
                 <a:latin typeface="Consolas" pitchFamily="49" charset="0"/>
                 <a:cs typeface="Consolas" pitchFamily="49" charset="0"/>
               </a:rPr>
-              <a:t>unction printArguments(){</a:t>
-            </a:r>
+              <a:t>unction printArguments</a:t>
+            </a:r>
+            <a:r>
+              <a:rPr lang="en-US" sz="1800" b="1" noProof="1" smtClean="0">
+                <a:solidFill>
+                  <a:srgbClr val="8CF4F2"/>
+                </a:solidFill>
+                <a:effectLst>
+                  <a:outerShdw blurRad="38100" dist="38100" dir="2700000" algn="tl">
+                    <a:srgbClr val="000000">
+                      <a:alpha val="43137"/>
+                    </a:srgbClr>
+                  </a:outerShdw>
+                </a:effectLst>
+                <a:latin typeface="Consolas" pitchFamily="49" charset="0"/>
+                <a:cs typeface="Consolas" pitchFamily="49" charset="0"/>
+              </a:rPr>
+              <a:t>() {</a:t>
+            </a:r>
+            <a:endParaRPr lang="en-US" sz="1800" b="1" noProof="1" smtClean="0">
+              <a:solidFill>
+                <a:srgbClr val="8CF4F2"/>
+              </a:solidFill>
+              <a:effectLst>
+                <a:outerShdw blurRad="38100" dist="38100" dir="2700000" algn="tl">
+                  <a:srgbClr val="000000">
+                    <a:alpha val="43137"/>
+                  </a:srgbClr>
+                </a:outerShdw>
+              </a:effectLst>
+              <a:latin typeface="Consolas" pitchFamily="49" charset="0"/>
+              <a:cs typeface="Consolas" pitchFamily="49" charset="0"/>
+            </a:endParaRPr>
           </a:p>
           <a:p>
             <a:pPr eaLnBrk="0" hangingPunct="0">
@@ -15932,8 +17027,39 @@
                 <a:latin typeface="Consolas" pitchFamily="49" charset="0"/>
                 <a:cs typeface="Consolas" pitchFamily="49" charset="0"/>
               </a:rPr>
-              <a:t>  for(var i in arguments){</a:t>
-            </a:r>
+              <a:t>  for(var i in arguments</a:t>
+            </a:r>
+            <a:r>
+              <a:rPr lang="en-US" b="1" noProof="1" smtClean="0">
+                <a:solidFill>
+                  <a:srgbClr val="8CF4F2"/>
+                </a:solidFill>
+                <a:effectLst>
+                  <a:outerShdw blurRad="38100" dist="38100" dir="2700000" algn="tl">
+                    <a:srgbClr val="000000">
+                      <a:alpha val="43137"/>
+                    </a:srgbClr>
+                  </a:outerShdw>
+                </a:effectLst>
+                <a:latin typeface="Consolas" pitchFamily="49" charset="0"/>
+                <a:cs typeface="Consolas" pitchFamily="49" charset="0"/>
+              </a:rPr>
+              <a:t>) {</a:t>
+            </a:r>
+            <a:endParaRPr lang="en-US" b="1" noProof="1" smtClean="0">
+              <a:solidFill>
+                <a:srgbClr val="8CF4F2"/>
+              </a:solidFill>
+              <a:effectLst>
+                <a:outerShdw blurRad="38100" dist="38100" dir="2700000" algn="tl">
+                  <a:srgbClr val="000000">
+                    <a:alpha val="43137"/>
+                  </a:srgbClr>
+                </a:outerShdw>
+              </a:effectLst>
+              <a:latin typeface="Consolas" pitchFamily="49" charset="0"/>
+              <a:cs typeface="Consolas" pitchFamily="49" charset="0"/>
+            </a:endParaRPr>
           </a:p>
           <a:p>
             <a:pPr eaLnBrk="0" hangingPunct="0">
@@ -16099,7 +17225,41 @@
                 <a:latin typeface="Consolas" pitchFamily="49" charset="0"/>
                 <a:cs typeface="Consolas" pitchFamily="49" charset="0"/>
               </a:rPr>
-              <a:t>printArguments(1,2,3,4); //1, 2, 3, 4</a:t>
+              <a:t>printArguments(1</a:t>
+            </a:r>
+            <a:r>
+              <a:rPr lang="en-US" b="1" noProof="1" smtClean="0">
+                <a:solidFill>
+                  <a:srgbClr val="8CF4F2"/>
+                </a:solidFill>
+                <a:effectLst>
+                  <a:outerShdw blurRad="38100" dist="38100" dir="2700000" algn="tl">
+                    <a:srgbClr val="000000">
+                      <a:alpha val="43137"/>
+                    </a:srgbClr>
+                  </a:outerShdw>
+                </a:effectLst>
+                <a:latin typeface="Consolas" pitchFamily="49" charset="0"/>
+                <a:cs typeface="Consolas" pitchFamily="49" charset="0"/>
+              </a:rPr>
+              <a:t>, 2, 3, 4</a:t>
+            </a:r>
+            <a:r>
+              <a:rPr lang="en-US" b="1" noProof="1" smtClean="0">
+                <a:solidFill>
+                  <a:srgbClr val="8CF4F2"/>
+                </a:solidFill>
+                <a:effectLst>
+                  <a:outerShdw blurRad="38100" dist="38100" dir="2700000" algn="tl">
+                    <a:srgbClr val="000000">
+                      <a:alpha val="43137"/>
+                    </a:srgbClr>
+                  </a:outerShdw>
+                </a:effectLst>
+                <a:latin typeface="Consolas" pitchFamily="49" charset="0"/>
+                <a:cs typeface="Consolas" pitchFamily="49" charset="0"/>
+              </a:rPr>
+              <a:t>); //1, 2, 3, 4</a:t>
             </a:r>
             <a:endParaRPr lang="en-US" sz="1800" b="1" noProof="1">
               <a:solidFill>
@@ -17265,8 +18425,39 @@
                 <a:latin typeface="Consolas" pitchFamily="49" charset="0"/>
                 <a:cs typeface="Consolas" pitchFamily="49" charset="0"/>
               </a:rPr>
-              <a:t>function multiply(firstNum, secondNum){</a:t>
-            </a:r>
+              <a:t>function multiply(firstNum, secondNum</a:t>
+            </a:r>
+            <a:r>
+              <a:rPr lang="en-US" sz="2000" b="1" noProof="1" smtClean="0">
+                <a:solidFill>
+                  <a:srgbClr val="8CF4F2"/>
+                </a:solidFill>
+                <a:effectLst>
+                  <a:outerShdw blurRad="38100" dist="38100" dir="2700000" algn="tl">
+                    <a:srgbClr val="000000">
+                      <a:alpha val="43137"/>
+                    </a:srgbClr>
+                  </a:outerShdw>
+                </a:effectLst>
+                <a:latin typeface="Consolas" pitchFamily="49" charset="0"/>
+                <a:cs typeface="Consolas" pitchFamily="49" charset="0"/>
+              </a:rPr>
+              <a:t>) {</a:t>
+            </a:r>
+            <a:endParaRPr lang="en-US" sz="2000" b="1" noProof="1" smtClean="0">
+              <a:solidFill>
+                <a:srgbClr val="8CF4F2"/>
+              </a:solidFill>
+              <a:effectLst>
+                <a:outerShdw blurRad="38100" dist="38100" dir="2700000" algn="tl">
+                  <a:srgbClr val="000000">
+                    <a:alpha val="43137"/>
+                  </a:srgbClr>
+                </a:outerShdw>
+              </a:effectLst>
+              <a:latin typeface="Consolas" pitchFamily="49" charset="0"/>
+              <a:cs typeface="Consolas" pitchFamily="49" charset="0"/>
+            </a:endParaRPr>
           </a:p>
           <a:p>
             <a:pPr eaLnBrk="0" hangingPunct="0">
@@ -18108,8 +19299,39 @@
                 <a:latin typeface="Consolas" pitchFamily="49" charset="0"/>
                 <a:cs typeface="Consolas" pitchFamily="49" charset="0"/>
               </a:rPr>
-              <a:t>function sum(numbers){</a:t>
-            </a:r>
+              <a:t>function sum(numbers</a:t>
+            </a:r>
+            <a:r>
+              <a:rPr lang="en-US" sz="1800" b="1" noProof="1" smtClean="0">
+                <a:solidFill>
+                  <a:srgbClr val="8CF4F2"/>
+                </a:solidFill>
+                <a:effectLst>
+                  <a:outerShdw blurRad="38100" dist="38100" dir="2700000" algn="tl">
+                    <a:srgbClr val="000000">
+                      <a:alpha val="43137"/>
+                    </a:srgbClr>
+                  </a:outerShdw>
+                </a:effectLst>
+                <a:latin typeface="Consolas" pitchFamily="49" charset="0"/>
+                <a:cs typeface="Consolas" pitchFamily="49" charset="0"/>
+              </a:rPr>
+              <a:t>) {</a:t>
+            </a:r>
+            <a:endParaRPr lang="en-US" sz="1800" b="1" noProof="1" smtClean="0">
+              <a:solidFill>
+                <a:srgbClr val="8CF4F2"/>
+              </a:solidFill>
+              <a:effectLst>
+                <a:outerShdw blurRad="38100" dist="38100" dir="2700000" algn="tl">
+                  <a:srgbClr val="000000">
+                    <a:alpha val="43137"/>
+                  </a:srgbClr>
+                </a:outerShdw>
+              </a:effectLst>
+              <a:latin typeface="Consolas" pitchFamily="49" charset="0"/>
+              <a:cs typeface="Consolas" pitchFamily="49" charset="0"/>
+            </a:endParaRPr>
           </a:p>
           <a:p>
             <a:pPr eaLnBrk="0" hangingPunct="0">
@@ -18306,8 +19528,73 @@
                 <a:latin typeface="Consolas" pitchFamily="49" charset="0"/>
                 <a:cs typeface="Consolas" pitchFamily="49" charset="0"/>
               </a:rPr>
-              <a:t>    if(numbers[i]%2 == 0){</a:t>
-            </a:r>
+              <a:t>    if(numbers[i</a:t>
+            </a:r>
+            <a:r>
+              <a:rPr lang="en-US" b="1" noProof="1" smtClean="0">
+                <a:solidFill>
+                  <a:srgbClr val="8CF4F2"/>
+                </a:solidFill>
+                <a:effectLst>
+                  <a:outerShdw blurRad="38100" dist="38100" dir="2700000" algn="tl">
+                    <a:srgbClr val="000000">
+                      <a:alpha val="43137"/>
+                    </a:srgbClr>
+                  </a:outerShdw>
+                </a:effectLst>
+                <a:latin typeface="Consolas" pitchFamily="49" charset="0"/>
+                <a:cs typeface="Consolas" pitchFamily="49" charset="0"/>
+              </a:rPr>
+              <a:t>] % 2 </a:t>
+            </a:r>
+            <a:r>
+              <a:rPr lang="en-US" b="1" noProof="1" smtClean="0">
+                <a:solidFill>
+                  <a:srgbClr val="8CF4F2"/>
+                </a:solidFill>
+                <a:effectLst>
+                  <a:outerShdw blurRad="38100" dist="38100" dir="2700000" algn="tl">
+                    <a:srgbClr val="000000">
+                      <a:alpha val="43137"/>
+                    </a:srgbClr>
+                  </a:outerShdw>
+                </a:effectLst>
+                <a:latin typeface="Consolas" pitchFamily="49" charset="0"/>
+                <a:cs typeface="Consolas" pitchFamily="49" charset="0"/>
+              </a:rPr>
+              <a:t>== 0</a:t>
+            </a:r>
+            <a:r>
+              <a:rPr lang="en-US" b="1" noProof="1" smtClean="0">
+                <a:solidFill>
+                  <a:srgbClr val="8CF4F2"/>
+                </a:solidFill>
+                <a:effectLst>
+                  <a:outerShdw blurRad="38100" dist="38100" dir="2700000" algn="tl">
+                    <a:srgbClr val="000000">
+                      <a:alpha val="43137"/>
+                    </a:srgbClr>
+                  </a:outerShdw>
+                </a:effectLst>
+                <a:latin typeface="Consolas" pitchFamily="49" charset="0"/>
+                <a:cs typeface="Consolas" pitchFamily="49" charset="0"/>
+              </a:rPr>
+              <a:t>) {</a:t>
+            </a:r>
+            <a:endParaRPr lang="en-US" b="1" noProof="1" smtClean="0">
+              <a:solidFill>
+                <a:srgbClr val="8CF4F2"/>
+              </a:solidFill>
+              <a:effectLst>
+                <a:outerShdw blurRad="38100" dist="38100" dir="2700000" algn="tl">
+                  <a:srgbClr val="000000">
+                    <a:alpha val="43137"/>
+                  </a:srgbClr>
+                </a:outerShdw>
+              </a:effectLst>
+              <a:latin typeface="Consolas" pitchFamily="49" charset="0"/>
+              <a:cs typeface="Consolas" pitchFamily="49" charset="0"/>
+            </a:endParaRPr>
           </a:p>
           <a:p>
             <a:pPr eaLnBrk="0" hangingPunct="0">
@@ -19331,8 +20618,39 @@
                 <a:latin typeface="Consolas" pitchFamily="49" charset="0"/>
                 <a:cs typeface="Consolas" pitchFamily="49" charset="0"/>
               </a:rPr>
-              <a:t>function countOccurences (value){</a:t>
-            </a:r>
+              <a:t>function countOccurences (value</a:t>
+            </a:r>
+            <a:r>
+              <a:rPr lang="en-US" b="1" noProof="1" smtClean="0">
+                <a:solidFill>
+                  <a:srgbClr val="8CF4F2"/>
+                </a:solidFill>
+                <a:effectLst>
+                  <a:outerShdw blurRad="38100" dist="38100" dir="2700000" algn="tl">
+                    <a:srgbClr val="000000">
+                      <a:alpha val="43137"/>
+                    </a:srgbClr>
+                  </a:outerShdw>
+                </a:effectLst>
+                <a:latin typeface="Consolas" pitchFamily="49" charset="0"/>
+                <a:cs typeface="Consolas" pitchFamily="49" charset="0"/>
+              </a:rPr>
+              <a:t>) {</a:t>
+            </a:r>
+            <a:endParaRPr lang="en-US" b="1" noProof="1" smtClean="0">
+              <a:solidFill>
+                <a:srgbClr val="8CF4F2"/>
+              </a:solidFill>
+              <a:effectLst>
+                <a:outerShdw blurRad="38100" dist="38100" dir="2700000" algn="tl">
+                  <a:srgbClr val="000000">
+                    <a:alpha val="43137"/>
+                  </a:srgbClr>
+                </a:outerShdw>
+              </a:effectLst>
+              <a:latin typeface="Consolas" pitchFamily="49" charset="0"/>
+              <a:cs typeface="Consolas" pitchFamily="49" charset="0"/>
+            </a:endParaRPr>
           </a:p>
           <a:p>
             <a:pPr eaLnBrk="0" hangingPunct="0">
@@ -19461,8 +20779,39 @@
                 <a:latin typeface="Consolas" pitchFamily="49" charset="0"/>
                 <a:cs typeface="Consolas" pitchFamily="49" charset="0"/>
               </a:rPr>
-              <a:t>&lt; arr.length; i++){</a:t>
-            </a:r>
+              <a:t>&lt; arr.length; i</a:t>
+            </a:r>
+            <a:r>
+              <a:rPr lang="en-US" b="1" noProof="1" smtClean="0">
+                <a:solidFill>
+                  <a:srgbClr val="8CF4F2"/>
+                </a:solidFill>
+                <a:effectLst>
+                  <a:outerShdw blurRad="38100" dist="38100" dir="2700000" algn="tl">
+                    <a:srgbClr val="000000">
+                      <a:alpha val="43137"/>
+                    </a:srgbClr>
+                  </a:outerShdw>
+                </a:effectLst>
+                <a:latin typeface="Consolas" pitchFamily="49" charset="0"/>
+                <a:cs typeface="Consolas" pitchFamily="49" charset="0"/>
+              </a:rPr>
+              <a:t>++) {</a:t>
+            </a:r>
+            <a:endParaRPr lang="en-US" b="1" noProof="1" smtClean="0">
+              <a:solidFill>
+                <a:srgbClr val="8CF4F2"/>
+              </a:solidFill>
+              <a:effectLst>
+                <a:outerShdw blurRad="38100" dist="38100" dir="2700000" algn="tl">
+                  <a:srgbClr val="000000">
+                    <a:alpha val="43137"/>
+                  </a:srgbClr>
+                </a:outerShdw>
+              </a:effectLst>
+              <a:latin typeface="Consolas" pitchFamily="49" charset="0"/>
+              <a:cs typeface="Consolas" pitchFamily="49" charset="0"/>
+            </a:endParaRPr>
           </a:p>
           <a:p>
             <a:pPr eaLnBrk="0" hangingPunct="0">
@@ -19509,8 +20858,39 @@
                 <a:latin typeface="Consolas" pitchFamily="49" charset="0"/>
                 <a:cs typeface="Consolas" pitchFamily="49" charset="0"/>
               </a:rPr>
-              <a:t>   if (arr[i] == value){</a:t>
-            </a:r>
+              <a:t>   if (arr[i] == value</a:t>
+            </a:r>
+            <a:r>
+              <a:rPr lang="en-US" b="1" noProof="1" smtClean="0">
+                <a:solidFill>
+                  <a:srgbClr val="8CF4F2"/>
+                </a:solidFill>
+                <a:effectLst>
+                  <a:outerShdw blurRad="38100" dist="38100" dir="2700000" algn="tl">
+                    <a:srgbClr val="000000">
+                      <a:alpha val="43137"/>
+                    </a:srgbClr>
+                  </a:outerShdw>
+                </a:effectLst>
+                <a:latin typeface="Consolas" pitchFamily="49" charset="0"/>
+                <a:cs typeface="Consolas" pitchFamily="49" charset="0"/>
+              </a:rPr>
+              <a:t>) {</a:t>
+            </a:r>
+            <a:endParaRPr lang="en-US" b="1" noProof="1" smtClean="0">
+              <a:solidFill>
+                <a:srgbClr val="8CF4F2"/>
+              </a:solidFill>
+              <a:effectLst>
+                <a:outerShdw blurRad="38100" dist="38100" dir="2700000" algn="tl">
+                  <a:srgbClr val="000000">
+                    <a:alpha val="43137"/>
+                  </a:srgbClr>
+                </a:outerShdw>
+              </a:effectLst>
+              <a:latin typeface="Consolas" pitchFamily="49" charset="0"/>
+              <a:cs typeface="Consolas" pitchFamily="49" charset="0"/>
+            </a:endParaRPr>
           </a:p>
           <a:p>
             <a:pPr eaLnBrk="0" hangingPunct="0">
@@ -20855,8 +22235,39 @@
                 <a:latin typeface="Consolas" pitchFamily="49" charset="0"/>
                 <a:cs typeface="Consolas" pitchFamily="49" charset="0"/>
               </a:rPr>
-              <a:t>function print(number){</a:t>
-            </a:r>
+              <a:t>function print(number</a:t>
+            </a:r>
+            <a:r>
+              <a:rPr lang="en-US" sz="1800" b="1" noProof="1" smtClean="0">
+                <a:solidFill>
+                  <a:srgbClr val="8CF4F2"/>
+                </a:solidFill>
+                <a:effectLst>
+                  <a:outerShdw blurRad="38100" dist="38100" dir="2700000" algn="tl">
+                    <a:srgbClr val="000000">
+                      <a:alpha val="43137"/>
+                    </a:srgbClr>
+                  </a:outerShdw>
+                </a:effectLst>
+                <a:latin typeface="Consolas" pitchFamily="49" charset="0"/>
+                <a:cs typeface="Consolas" pitchFamily="49" charset="0"/>
+              </a:rPr>
+              <a:t>) {</a:t>
+            </a:r>
+            <a:endParaRPr lang="en-US" sz="1800" b="1" noProof="1" smtClean="0">
+              <a:solidFill>
+                <a:srgbClr val="8CF4F2"/>
+              </a:solidFill>
+              <a:effectLst>
+                <a:outerShdw blurRad="38100" dist="38100" dir="2700000" algn="tl">
+                  <a:srgbClr val="000000">
+                    <a:alpha val="43137"/>
+                  </a:srgbClr>
+                </a:outerShdw>
+              </a:effectLst>
+              <a:latin typeface="Consolas" pitchFamily="49" charset="0"/>
+              <a:cs typeface="Consolas" pitchFamily="49" charset="0"/>
+            </a:endParaRPr>
           </a:p>
           <a:p>
             <a:pPr eaLnBrk="0" hangingPunct="0">
@@ -20886,7 +22297,75 @@
                 <a:latin typeface="Consolas" pitchFamily="49" charset="0"/>
                 <a:cs typeface="Consolas" pitchFamily="49" charset="0"/>
               </a:rPr>
-              <a:t>  console.log("Number:" + number);</a:t>
+              <a:t>  console.log</a:t>
+            </a:r>
+            <a:r>
+              <a:rPr lang="en-US" b="1" noProof="1">
+                <a:solidFill>
+                  <a:srgbClr val="8CF4F2"/>
+                </a:solidFill>
+                <a:effectLst>
+                  <a:outerShdw blurRad="38100" dist="38100" dir="2700000" algn="tl">
+                    <a:srgbClr val="000000">
+                      <a:alpha val="43137"/>
+                    </a:srgbClr>
+                  </a:outerShdw>
+                </a:effectLst>
+                <a:latin typeface="Consolas" pitchFamily="49" charset="0"/>
+                <a:cs typeface="Consolas" pitchFamily="49" charset="0"/>
+              </a:rPr>
+              <a:t>(</a:t>
+            </a:r>
+            <a:r>
+              <a:rPr lang="en-US" b="1" noProof="1">
+                <a:solidFill>
+                  <a:srgbClr val="8CF4F2"/>
+                </a:solidFill>
+                <a:effectLst>
+                  <a:outerShdw blurRad="38100" dist="38100" dir="2700000" algn="tl">
+                    <a:srgbClr val="000000">
+                      <a:alpha val="43137"/>
+                    </a:srgbClr>
+                  </a:outerShdw>
+                </a:effectLst>
+                <a:latin typeface="Consolas" pitchFamily="49" charset="0"/>
+                <a:cs typeface="Consolas" pitchFamily="49" charset="0"/>
+              </a:rPr>
+              <a:t>'Number</a:t>
+            </a:r>
+            <a:r>
+              <a:rPr lang="en-US" b="1" noProof="1" smtClean="0">
+                <a:solidFill>
+                  <a:srgbClr val="8CF4F2"/>
+                </a:solidFill>
+                <a:effectLst>
+                  <a:outerShdw blurRad="38100" dist="38100" dir="2700000" algn="tl">
+                    <a:srgbClr val="000000">
+                      <a:alpha val="43137"/>
+                    </a:srgbClr>
+                  </a:outerShdw>
+                </a:effectLst>
+                <a:latin typeface="Consolas" pitchFamily="49" charset="0"/>
+                <a:cs typeface="Consolas" pitchFamily="49" charset="0"/>
+              </a:rPr>
+              <a:t>: ' </a:t>
+            </a:r>
+            <a:r>
+              <a:rPr lang="en-US" sz="1800" b="1" noProof="1" smtClean="0">
+                <a:solidFill>
+                  <a:srgbClr val="8CF4F2"/>
+                </a:solidFill>
+                <a:effectLst>
+                  <a:outerShdw blurRad="38100" dist="38100" dir="2700000" algn="tl">
+                    <a:srgbClr val="000000">
+                      <a:alpha val="43137"/>
+                    </a:srgbClr>
+                  </a:outerShdw>
+                </a:effectLst>
+                <a:latin typeface="Consolas" pitchFamily="49" charset="0"/>
+                <a:cs typeface="Consolas" pitchFamily="49" charset="0"/>
+              </a:rPr>
+              <a:t>+ number);</a:t>
             </a:r>
           </a:p>
           <a:p>
@@ -20965,7 +22444,24 @@
                 <a:latin typeface="Consolas" pitchFamily="49" charset="0"/>
                 <a:cs typeface="Consolas" pitchFamily="49" charset="0"/>
               </a:rPr>
-              <a:t>unction print(number,text){</a:t>
+              <a:t>unction print(number,text</a:t>
+            </a:r>
+            <a:r>
+              <a:rPr lang="en-US" b="1" noProof="1" smtClean="0">
+                <a:solidFill>
+                  <a:srgbClr val="8CF4F2"/>
+                </a:solidFill>
+                <a:effectLst>
+                  <a:outerShdw blurRad="38100" dist="38100" dir="2700000" algn="tl">
+                    <a:srgbClr val="000000">
+                      <a:alpha val="43137"/>
+                    </a:srgbClr>
+                  </a:outerShdw>
+                </a:effectLst>
+                <a:latin typeface="Consolas" pitchFamily="49" charset="0"/>
+                <a:cs typeface="Consolas" pitchFamily="49" charset="0"/>
+              </a:rPr>
+              <a:t>) {</a:t>
             </a:r>
             <a:endParaRPr lang="en-US" b="1" noProof="1">
               <a:solidFill>
@@ -21010,7 +22506,7 @@
                 <a:latin typeface="Consolas" pitchFamily="49" charset="0"/>
                 <a:cs typeface="Consolas" pitchFamily="49" charset="0"/>
               </a:rPr>
-              <a:t>  console.log("Number:" + </a:t>
+              <a:t>  console.log</a:t>
             </a:r>
             <a:r>
               <a:rPr lang="en-US" b="1" noProof="1" smtClean="0">
@@ -21027,7 +22523,211 @@
                 <a:latin typeface="Consolas" pitchFamily="49" charset="0"/>
                 <a:cs typeface="Consolas" pitchFamily="49" charset="0"/>
               </a:rPr>
-              <a:t>number + "\nText: " + text);</a:t>
+              <a:t>(</a:t>
+            </a:r>
+            <a:r>
+              <a:rPr lang="en-US" b="1" noProof="1">
+                <a:solidFill>
+                  <a:srgbClr val="8CF4F2"/>
+                </a:solidFill>
+                <a:effectLst>
+                  <a:outerShdw blurRad="38100" dist="38100" dir="2700000" algn="tl">
+                    <a:srgbClr val="000000">
+                      <a:alpha val="43137"/>
+                    </a:srgbClr>
+                  </a:outerShdw>
+                </a:effectLst>
+                <a:latin typeface="Consolas" pitchFamily="49" charset="0"/>
+                <a:cs typeface="Consolas" pitchFamily="49" charset="0"/>
+              </a:rPr>
+              <a:t>'</a:t>
+            </a:r>
+            <a:r>
+              <a:rPr lang="en-US" b="1" noProof="1" smtClean="0">
+                <a:solidFill>
+                  <a:srgbClr val="8CF4F2"/>
+                </a:solidFill>
+                <a:effectLst>
+                  <a:outerShdw blurRad="38100" dist="38100" dir="2700000" algn="tl">
+                    <a:srgbClr val="000000">
+                      <a:alpha val="43137"/>
+                    </a:srgbClr>
+                  </a:outerShdw>
+                </a:effectLst>
+                <a:latin typeface="Consolas" pitchFamily="49" charset="0"/>
+                <a:cs typeface="Consolas" pitchFamily="49" charset="0"/>
+              </a:rPr>
+              <a:t>Number: </a:t>
+            </a:r>
+            <a:r>
+              <a:rPr lang="en-US" b="1" noProof="1" smtClean="0">
+                <a:solidFill>
+                  <a:srgbClr val="8CF4F2"/>
+                </a:solidFill>
+                <a:effectLst>
+                  <a:outerShdw blurRad="38100" dist="38100" dir="2700000" algn="tl">
+                    <a:srgbClr val="000000">
+                      <a:alpha val="43137"/>
+                    </a:srgbClr>
+                  </a:outerShdw>
+                </a:effectLst>
+                <a:latin typeface="Consolas" pitchFamily="49" charset="0"/>
+                <a:cs typeface="Consolas" pitchFamily="49" charset="0"/>
+              </a:rPr>
+              <a:t>'</a:t>
+            </a:r>
+            <a:r>
+              <a:rPr lang="en-US" b="1" noProof="1" smtClean="0">
+                <a:solidFill>
+                  <a:srgbClr val="8CF4F2"/>
+                </a:solidFill>
+                <a:effectLst>
+                  <a:outerShdw blurRad="38100" dist="38100" dir="2700000" algn="tl">
+                    <a:srgbClr val="000000">
+                      <a:alpha val="43137"/>
+                    </a:srgbClr>
+                  </a:outerShdw>
+                </a:effectLst>
+                <a:latin typeface="Consolas" pitchFamily="49" charset="0"/>
+                <a:cs typeface="Consolas" pitchFamily="49" charset="0"/>
+              </a:rPr>
+              <a:t> </a:t>
+            </a:r>
+            <a:r>
+              <a:rPr lang="en-US" b="1" noProof="1">
+                <a:solidFill>
+                  <a:srgbClr val="8CF4F2"/>
+                </a:solidFill>
+                <a:effectLst>
+                  <a:outerShdw blurRad="38100" dist="38100" dir="2700000" algn="tl">
+                    <a:srgbClr val="000000">
+                      <a:alpha val="43137"/>
+                    </a:srgbClr>
+                  </a:outerShdw>
+                </a:effectLst>
+                <a:latin typeface="Consolas" pitchFamily="49" charset="0"/>
+                <a:cs typeface="Consolas" pitchFamily="49" charset="0"/>
+              </a:rPr>
+              <a:t>+ </a:t>
+            </a:r>
+            <a:r>
+              <a:rPr lang="en-US" b="1" noProof="1" smtClean="0">
+                <a:solidFill>
+                  <a:srgbClr val="8CF4F2"/>
+                </a:solidFill>
+                <a:effectLst>
+                  <a:outerShdw blurRad="38100" dist="38100" dir="2700000" algn="tl">
+                    <a:srgbClr val="000000">
+                      <a:alpha val="43137"/>
+                    </a:srgbClr>
+                  </a:outerShdw>
+                </a:effectLst>
+                <a:latin typeface="Consolas" pitchFamily="49" charset="0"/>
+                <a:cs typeface="Consolas" pitchFamily="49" charset="0"/>
+              </a:rPr>
+              <a:t>number + </a:t>
+            </a:r>
+            <a:r>
+              <a:rPr lang="en-US" b="1" noProof="1">
+                <a:solidFill>
+                  <a:srgbClr val="8CF4F2"/>
+                </a:solidFill>
+                <a:effectLst>
+                  <a:outerShdw blurRad="38100" dist="38100" dir="2700000" algn="tl">
+                    <a:srgbClr val="000000">
+                      <a:alpha val="43137"/>
+                    </a:srgbClr>
+                  </a:outerShdw>
+                </a:effectLst>
+                <a:latin typeface="Consolas" pitchFamily="49" charset="0"/>
+                <a:cs typeface="Consolas" pitchFamily="49" charset="0"/>
+              </a:rPr>
+              <a:t>'</a:t>
+            </a:r>
+            <a:r>
+              <a:rPr lang="en-US" b="1" noProof="1" smtClean="0">
+                <a:solidFill>
+                  <a:srgbClr val="8CF4F2"/>
+                </a:solidFill>
+                <a:effectLst>
+                  <a:outerShdw blurRad="38100" dist="38100" dir="2700000" algn="tl">
+                    <a:srgbClr val="000000">
+                      <a:alpha val="43137"/>
+                    </a:srgbClr>
+                  </a:outerShdw>
+                </a:effectLst>
+                <a:latin typeface="Consolas" pitchFamily="49" charset="0"/>
+                <a:cs typeface="Consolas" pitchFamily="49" charset="0"/>
+              </a:rPr>
+              <a:t>\</a:t>
+            </a:r>
+            <a:r>
+              <a:rPr lang="en-US" b="1" noProof="1" smtClean="0">
+                <a:solidFill>
+                  <a:srgbClr val="8CF4F2"/>
+                </a:solidFill>
+                <a:effectLst>
+                  <a:outerShdw blurRad="38100" dist="38100" dir="2700000" algn="tl">
+                    <a:srgbClr val="000000">
+                      <a:alpha val="43137"/>
+                    </a:srgbClr>
+                  </a:outerShdw>
+                </a:effectLst>
+                <a:latin typeface="Consolas" pitchFamily="49" charset="0"/>
+                <a:cs typeface="Consolas" pitchFamily="49" charset="0"/>
+              </a:rPr>
+              <a:t>nText: </a:t>
+            </a:r>
+            <a:r>
+              <a:rPr lang="en-US" b="1" noProof="1">
+                <a:solidFill>
+                  <a:srgbClr val="8CF4F2"/>
+                </a:solidFill>
+                <a:effectLst>
+                  <a:outerShdw blurRad="38100" dist="38100" dir="2700000" algn="tl">
+                    <a:srgbClr val="000000">
+                      <a:alpha val="43137"/>
+                    </a:srgbClr>
+                  </a:outerShdw>
+                </a:effectLst>
+                <a:latin typeface="Consolas" pitchFamily="49" charset="0"/>
+                <a:cs typeface="Consolas" pitchFamily="49" charset="0"/>
+              </a:rPr>
+              <a:t>'</a:t>
+            </a:r>
+            <a:r>
+              <a:rPr lang="en-US" b="1" noProof="1" smtClean="0">
+                <a:solidFill>
+                  <a:srgbClr val="8CF4F2"/>
+                </a:solidFill>
+                <a:effectLst>
+                  <a:outerShdw blurRad="38100" dist="38100" dir="2700000" algn="tl">
+                    <a:srgbClr val="000000">
+                      <a:alpha val="43137"/>
+                    </a:srgbClr>
+                  </a:outerShdw>
+                </a:effectLst>
+                <a:latin typeface="Consolas" pitchFamily="49" charset="0"/>
+                <a:cs typeface="Consolas" pitchFamily="49" charset="0"/>
+              </a:rPr>
+              <a:t> </a:t>
+            </a:r>
+            <a:r>
+              <a:rPr lang="en-US" b="1" noProof="1" smtClean="0">
+                <a:solidFill>
+                  <a:srgbClr val="8CF4F2"/>
+                </a:solidFill>
+                <a:effectLst>
+                  <a:outerShdw blurRad="38100" dist="38100" dir="2700000" algn="tl">
+                    <a:srgbClr val="000000">
+                      <a:alpha val="43137"/>
+                    </a:srgbClr>
+                  </a:outerShdw>
+                </a:effectLst>
+                <a:latin typeface="Consolas" pitchFamily="49" charset="0"/>
+                <a:cs typeface="Consolas" pitchFamily="49" charset="0"/>
+              </a:rPr>
+              <a:t>+ text);</a:t>
             </a:r>
           </a:p>
           <a:p>
@@ -21921,22 +23621,36 @@
               <a:t>, text</a:t>
             </a:r>
             <a:r>
-              <a:rPr lang="en-US" b="1" noProof="1">
-                <a:solidFill>
-                  <a:srgbClr val="8CF4F2"/>
-                </a:solidFill>
-                <a:effectLst>
-                  <a:outerShdw blurRad="38100" dist="38100" dir="2700000" algn="tl">
-                    <a:srgbClr val="000000">
-                      <a:alpha val="43137"/>
-                    </a:srgbClr>
-                  </a:outerShdw>
-                </a:effectLst>
-                <a:latin typeface="Consolas" pitchFamily="49" charset="0"/>
-                <a:cs typeface="Consolas" pitchFamily="49" charset="0"/>
-              </a:rPr>
-              <a:t>){</a:t>
-            </a:r>
+              <a:rPr lang="en-US" b="1" noProof="1" smtClean="0">
+                <a:solidFill>
+                  <a:srgbClr val="8CF4F2"/>
+                </a:solidFill>
+                <a:effectLst>
+                  <a:outerShdw blurRad="38100" dist="38100" dir="2700000" algn="tl">
+                    <a:srgbClr val="000000">
+                      <a:alpha val="43137"/>
+                    </a:srgbClr>
+                  </a:outerShdw>
+                </a:effectLst>
+                <a:latin typeface="Consolas" pitchFamily="49" charset="0"/>
+                <a:cs typeface="Consolas" pitchFamily="49" charset="0"/>
+              </a:rPr>
+              <a:t>) {</a:t>
+            </a:r>
+            <a:endParaRPr lang="en-US" b="1" noProof="1">
+              <a:solidFill>
+                <a:srgbClr val="8CF4F2"/>
+              </a:solidFill>
+              <a:effectLst>
+                <a:outerShdw blurRad="38100" dist="38100" dir="2700000" algn="tl">
+                  <a:srgbClr val="000000">
+                    <a:alpha val="43137"/>
+                  </a:srgbClr>
+                </a:outerShdw>
+              </a:effectLst>
+              <a:latin typeface="Consolas" pitchFamily="49" charset="0"/>
+              <a:cs typeface="Consolas" pitchFamily="49" charset="0"/>
+            </a:endParaRPr>
           </a:p>
           <a:p>
             <a:pPr eaLnBrk="0" hangingPunct="0">
@@ -21963,19 +23677,8 @@
                 <a:latin typeface="Consolas" pitchFamily="49" charset="0"/>
                 <a:cs typeface="Consolas" pitchFamily="49" charset="0"/>
               </a:rPr>
-              <a:t>  switch (arguments.length){</a:t>
-            </a:r>
-          </a:p>
-          <a:p>
-            <a:pPr eaLnBrk="0" hangingPunct="0">
-              <a:buClr>
-                <a:schemeClr val="accent5">
-                  <a:lumMod val="40000"/>
-                  <a:lumOff val="60000"/>
-                </a:schemeClr>
-              </a:buClr>
-              <a:buSzPct val="70000"/>
-            </a:pPr>
+              <a:t>  switch (arguments.length</a:t>
+            </a:r>
             <a:r>
               <a:rPr lang="en-US" b="1" noProof="1" smtClean="0">
                 <a:solidFill>
@@ -21991,137 +23694,7 @@
                 <a:latin typeface="Consolas" pitchFamily="49" charset="0"/>
                 <a:cs typeface="Consolas" pitchFamily="49" charset="0"/>
               </a:rPr>
-              <a:t>    case </a:t>
-            </a:r>
-            <a:r>
-              <a:rPr lang="en-US" b="1" noProof="1">
-                <a:solidFill>
-                  <a:srgbClr val="8CF4F2"/>
-                </a:solidFill>
-                <a:effectLst>
-                  <a:outerShdw blurRad="38100" dist="38100" dir="2700000" algn="tl">
-                    <a:srgbClr val="000000">
-                      <a:alpha val="43137"/>
-                    </a:srgbClr>
-                  </a:outerShdw>
-                </a:effectLst>
-                <a:latin typeface="Consolas" pitchFamily="49" charset="0"/>
-                <a:cs typeface="Consolas" pitchFamily="49" charset="0"/>
-              </a:rPr>
-              <a:t>1 : </a:t>
-            </a:r>
-            <a:r>
-              <a:rPr lang="en-US" b="1" noProof="1" smtClean="0">
-                <a:solidFill>
-                  <a:srgbClr val="8CF4F2"/>
-                </a:solidFill>
-                <a:effectLst>
-                  <a:outerShdw blurRad="38100" dist="38100" dir="2700000" algn="tl">
-                    <a:srgbClr val="000000">
-                      <a:alpha val="43137"/>
-                    </a:srgbClr>
-                  </a:outerShdw>
-                </a:effectLst>
-                <a:latin typeface="Consolas" pitchFamily="49" charset="0"/>
-                <a:cs typeface="Consolas" pitchFamily="49" charset="0"/>
-              </a:rPr>
-              <a:t>console.log ("</a:t>
-            </a:r>
-            <a:r>
-              <a:rPr lang="en-US" b="1" noProof="1">
-                <a:solidFill>
-                  <a:srgbClr val="8CF4F2"/>
-                </a:solidFill>
-                <a:effectLst>
-                  <a:outerShdw blurRad="38100" dist="38100" dir="2700000" algn="tl">
-                    <a:srgbClr val="000000">
-                      <a:alpha val="43137"/>
-                    </a:srgbClr>
-                  </a:outerShdw>
-                </a:effectLst>
-                <a:latin typeface="Consolas" pitchFamily="49" charset="0"/>
-                <a:cs typeface="Consolas" pitchFamily="49" charset="0"/>
-              </a:rPr>
-              <a:t>Number :" + number</a:t>
-            </a:r>
-            <a:r>
-              <a:rPr lang="en-US" b="1" noProof="1" smtClean="0">
-                <a:solidFill>
-                  <a:srgbClr val="8CF4F2"/>
-                </a:solidFill>
-                <a:effectLst>
-                  <a:outerShdw blurRad="38100" dist="38100" dir="2700000" algn="tl">
-                    <a:srgbClr val="000000">
-                      <a:alpha val="43137"/>
-                    </a:srgbClr>
-                  </a:outerShdw>
-                </a:effectLst>
-                <a:latin typeface="Consolas" pitchFamily="49" charset="0"/>
-                <a:cs typeface="Consolas" pitchFamily="49" charset="0"/>
-              </a:rPr>
-              <a:t>); break</a:t>
-            </a:r>
-            <a:r>
-              <a:rPr lang="en-US" b="1" noProof="1">
-                <a:solidFill>
-                  <a:srgbClr val="8CF4F2"/>
-                </a:solidFill>
-                <a:effectLst>
-                  <a:outerShdw blurRad="38100" dist="38100" dir="2700000" algn="tl">
-                    <a:srgbClr val="000000">
-                      <a:alpha val="43137"/>
-                    </a:srgbClr>
-                  </a:outerShdw>
-                </a:effectLst>
-                <a:latin typeface="Consolas" pitchFamily="49" charset="0"/>
-                <a:cs typeface="Consolas" pitchFamily="49" charset="0"/>
-              </a:rPr>
-              <a:t>;</a:t>
-            </a:r>
-          </a:p>
-          <a:p>
-            <a:pPr eaLnBrk="0" hangingPunct="0">
-              <a:buClr>
-                <a:schemeClr val="accent5">
-                  <a:lumMod val="40000"/>
-                  <a:lumOff val="60000"/>
-                </a:schemeClr>
-              </a:buClr>
-              <a:buSzPct val="70000"/>
-            </a:pPr>
-            <a:r>
-              <a:rPr lang="en-US" b="1" noProof="1" smtClean="0">
-                <a:solidFill>
-                  <a:srgbClr val="8CF4F2"/>
-                </a:solidFill>
-                <a:effectLst>
-                  <a:outerShdw blurRad="38100" dist="38100" dir="2700000" algn="tl">
-                    <a:srgbClr val="000000">
-                      <a:alpha val="43137"/>
-                    </a:srgbClr>
-                  </a:outerShdw>
-                </a:effectLst>
-                <a:latin typeface="Consolas" pitchFamily="49" charset="0"/>
-                <a:cs typeface="Consolas" pitchFamily="49" charset="0"/>
-              </a:rPr>
-              <a:t>    case </a:t>
-            </a:r>
-            <a:r>
-              <a:rPr lang="en-US" b="1" noProof="1">
-                <a:solidFill>
-                  <a:srgbClr val="8CF4F2"/>
-                </a:solidFill>
-                <a:effectLst>
-                  <a:outerShdw blurRad="38100" dist="38100" dir="2700000" algn="tl">
-                    <a:srgbClr val="000000">
-                      <a:alpha val="43137"/>
-                    </a:srgbClr>
-                  </a:outerShdw>
-                </a:effectLst>
-                <a:latin typeface="Consolas" pitchFamily="49" charset="0"/>
-                <a:cs typeface="Consolas" pitchFamily="49" charset="0"/>
-              </a:rPr>
-              <a:t>2 : </a:t>
+              <a:t>) {</a:t>
             </a:r>
             <a:endParaRPr lang="en-US" b="1" noProof="1" smtClean="0">
               <a:solidFill>
@@ -22149,6 +23722,23 @@
               <a:buSzPct val="70000"/>
             </a:pPr>
             <a:r>
+              <a:rPr lang="en-US" b="1" noProof="1" smtClean="0">
+                <a:solidFill>
+                  <a:srgbClr val="8CF4F2"/>
+                </a:solidFill>
+                <a:effectLst>
+                  <a:outerShdw blurRad="38100" dist="38100" dir="2700000" algn="tl">
+                    <a:srgbClr val="000000">
+                      <a:alpha val="43137"/>
+                    </a:srgbClr>
+                  </a:outerShdw>
+                </a:effectLst>
+                <a:latin typeface="Consolas" pitchFamily="49" charset="0"/>
+                <a:cs typeface="Consolas" pitchFamily="49" charset="0"/>
+              </a:rPr>
+              <a:t>    case </a:t>
+            </a:r>
+            <a:r>
               <a:rPr lang="en-US" b="1" noProof="1">
                 <a:solidFill>
                   <a:srgbClr val="8CF4F2"/>
@@ -22163,9 +23753,128 @@
                 <a:latin typeface="Consolas" pitchFamily="49" charset="0"/>
                 <a:cs typeface="Consolas" pitchFamily="49" charset="0"/>
               </a:rPr>
+              <a:t>1 : </a:t>
+            </a:r>
+            <a:r>
+              <a:rPr lang="en-US" b="1" noProof="1" smtClean="0">
+                <a:solidFill>
+                  <a:srgbClr val="8CF4F2"/>
+                </a:solidFill>
+                <a:effectLst>
+                  <a:outerShdw blurRad="38100" dist="38100" dir="2700000" algn="tl">
+                    <a:srgbClr val="000000">
+                      <a:alpha val="43137"/>
+                    </a:srgbClr>
+                  </a:outerShdw>
+                </a:effectLst>
+                <a:latin typeface="Consolas" pitchFamily="49" charset="0"/>
+                <a:cs typeface="Consolas" pitchFamily="49" charset="0"/>
+              </a:rPr>
+              <a:t>console.log </a:t>
+            </a:r>
+            <a:r>
+              <a:rPr lang="en-US" b="1" noProof="1" smtClean="0">
+                <a:solidFill>
+                  <a:srgbClr val="8CF4F2"/>
+                </a:solidFill>
+                <a:effectLst>
+                  <a:outerShdw blurRad="38100" dist="38100" dir="2700000" algn="tl">
+                    <a:srgbClr val="000000">
+                      <a:alpha val="43137"/>
+                    </a:srgbClr>
+                  </a:outerShdw>
+                </a:effectLst>
+                <a:latin typeface="Consolas" pitchFamily="49" charset="0"/>
+                <a:cs typeface="Consolas" pitchFamily="49" charset="0"/>
+              </a:rPr>
+              <a:t>(</a:t>
+            </a:r>
+            <a:r>
+              <a:rPr lang="en-US" b="1" noProof="1">
+                <a:solidFill>
+                  <a:srgbClr val="8CF4F2"/>
+                </a:solidFill>
+                <a:effectLst>
+                  <a:outerShdw blurRad="38100" dist="38100" dir="2700000" algn="tl">
+                    <a:srgbClr val="000000">
+                      <a:alpha val="43137"/>
+                    </a:srgbClr>
+                  </a:outerShdw>
+                </a:effectLst>
+                <a:latin typeface="Consolas" pitchFamily="49" charset="0"/>
+                <a:cs typeface="Consolas" pitchFamily="49" charset="0"/>
+              </a:rPr>
+              <a:t>'</a:t>
+            </a:r>
+            <a:r>
+              <a:rPr lang="en-US" b="1" noProof="1" smtClean="0">
+                <a:solidFill>
+                  <a:srgbClr val="8CF4F2"/>
+                </a:solidFill>
+                <a:effectLst>
+                  <a:outerShdw blurRad="38100" dist="38100" dir="2700000" algn="tl">
+                    <a:srgbClr val="000000">
+                      <a:alpha val="43137"/>
+                    </a:srgbClr>
+                  </a:outerShdw>
+                </a:effectLst>
+                <a:latin typeface="Consolas" pitchFamily="49" charset="0"/>
+                <a:cs typeface="Consolas" pitchFamily="49" charset="0"/>
+              </a:rPr>
+              <a:t>Number :</a:t>
+            </a:r>
+            <a:r>
+              <a:rPr lang="en-US" b="1" noProof="1">
+                <a:solidFill>
+                  <a:srgbClr val="8CF4F2"/>
+                </a:solidFill>
+                <a:effectLst>
+                  <a:outerShdw blurRad="38100" dist="38100" dir="2700000" algn="tl">
+                    <a:srgbClr val="000000">
+                      <a:alpha val="43137"/>
+                    </a:srgbClr>
+                  </a:outerShdw>
+                </a:effectLst>
+                <a:latin typeface="Consolas" pitchFamily="49" charset="0"/>
+                <a:cs typeface="Consolas" pitchFamily="49" charset="0"/>
+              </a:rPr>
+              <a:t>'</a:t>
+            </a:r>
+            <a:r>
+              <a:rPr lang="en-US" b="1" noProof="1" smtClean="0">
+                <a:solidFill>
+                  <a:srgbClr val="8CF4F2"/>
+                </a:solidFill>
+                <a:effectLst>
+                  <a:outerShdw blurRad="38100" dist="38100" dir="2700000" algn="tl">
+                    <a:srgbClr val="000000">
+                      <a:alpha val="43137"/>
+                    </a:srgbClr>
+                  </a:outerShdw>
+                </a:effectLst>
+                <a:latin typeface="Consolas" pitchFamily="49" charset="0"/>
+                <a:cs typeface="Consolas" pitchFamily="49" charset="0"/>
+              </a:rPr>
               <a:t> </a:t>
             </a:r>
             <a:r>
+              <a:rPr lang="en-US" b="1" noProof="1">
+                <a:solidFill>
+                  <a:srgbClr val="8CF4F2"/>
+                </a:solidFill>
+                <a:effectLst>
+                  <a:outerShdw blurRad="38100" dist="38100" dir="2700000" algn="tl">
+                    <a:srgbClr val="000000">
+                      <a:alpha val="43137"/>
+                    </a:srgbClr>
+                  </a:outerShdw>
+                </a:effectLst>
+                <a:latin typeface="Consolas" pitchFamily="49" charset="0"/>
+                <a:cs typeface="Consolas" pitchFamily="49" charset="0"/>
+              </a:rPr>
+              <a:t>+ number</a:t>
+            </a:r>
+            <a:r>
               <a:rPr lang="en-US" b="1" noProof="1" smtClean="0">
                 <a:solidFill>
                   <a:srgbClr val="8CF4F2"/>
@@ -22180,7 +23889,7 @@
                 <a:latin typeface="Consolas" pitchFamily="49" charset="0"/>
                 <a:cs typeface="Consolas" pitchFamily="49" charset="0"/>
               </a:rPr>
-              <a:t>     console.log ("</a:t>
+              <a:t>); break</a:t>
             </a:r>
             <a:r>
               <a:rPr lang="en-US" b="1" noProof="1">
@@ -22197,7 +23906,52 @@
                 <a:latin typeface="Consolas" pitchFamily="49" charset="0"/>
                 <a:cs typeface="Consolas" pitchFamily="49" charset="0"/>
               </a:rPr>
-              <a:t>Number :" + number); </a:t>
+              <a:t>;</a:t>
+            </a:r>
+          </a:p>
+          <a:p>
+            <a:pPr eaLnBrk="0" hangingPunct="0">
+              <a:buClr>
+                <a:schemeClr val="accent5">
+                  <a:lumMod val="40000"/>
+                  <a:lumOff val="60000"/>
+                </a:schemeClr>
+              </a:buClr>
+              <a:buSzPct val="70000"/>
+            </a:pPr>
+            <a:r>
+              <a:rPr lang="en-US" b="1" noProof="1" smtClean="0">
+                <a:solidFill>
+                  <a:srgbClr val="8CF4F2"/>
+                </a:solidFill>
+                <a:effectLst>
+                  <a:outerShdw blurRad="38100" dist="38100" dir="2700000" algn="tl">
+                    <a:srgbClr val="000000">
+                      <a:alpha val="43137"/>
+                    </a:srgbClr>
+                  </a:outerShdw>
+                </a:effectLst>
+                <a:latin typeface="Consolas" pitchFamily="49" charset="0"/>
+                <a:cs typeface="Consolas" pitchFamily="49" charset="0"/>
+              </a:rPr>
+              <a:t>    case </a:t>
+            </a:r>
+            <a:r>
+              <a:rPr lang="en-US" b="1" noProof="1">
+                <a:solidFill>
+                  <a:srgbClr val="8CF4F2"/>
+                </a:solidFill>
+                <a:effectLst>
+                  <a:outerShdw blurRad="38100" dist="38100" dir="2700000" algn="tl">
+                    <a:srgbClr val="000000">
+                      <a:alpha val="43137"/>
+                    </a:srgbClr>
+                  </a:outerShdw>
+                </a:effectLst>
+                <a:latin typeface="Consolas" pitchFamily="49" charset="0"/>
+                <a:cs typeface="Consolas" pitchFamily="49" charset="0"/>
+              </a:rPr>
+              <a:t>2 : </a:t>
             </a:r>
             <a:endParaRPr lang="en-US" b="1" noProof="1" smtClean="0">
               <a:solidFill>
@@ -22256,7 +24010,24 @@
                 <a:latin typeface="Consolas" pitchFamily="49" charset="0"/>
                 <a:cs typeface="Consolas" pitchFamily="49" charset="0"/>
               </a:rPr>
-              <a:t>     console.log ("</a:t>
+              <a:t>     console.log </a:t>
+            </a:r>
+            <a:r>
+              <a:rPr lang="en-US" b="1" noProof="1" smtClean="0">
+                <a:solidFill>
+                  <a:srgbClr val="8CF4F2"/>
+                </a:solidFill>
+                <a:effectLst>
+                  <a:outerShdw blurRad="38100" dist="38100" dir="2700000" algn="tl">
+                    <a:srgbClr val="000000">
+                      <a:alpha val="43137"/>
+                    </a:srgbClr>
+                  </a:outerShdw>
+                </a:effectLst>
+                <a:latin typeface="Consolas" pitchFamily="49" charset="0"/>
+                <a:cs typeface="Consolas" pitchFamily="49" charset="0"/>
+              </a:rPr>
+              <a:t>(</a:t>
             </a:r>
             <a:r>
               <a:rPr lang="en-US" b="1" noProof="1">
@@ -22273,7 +24044,7 @@
                 <a:latin typeface="Consolas" pitchFamily="49" charset="0"/>
                 <a:cs typeface="Consolas" pitchFamily="49" charset="0"/>
               </a:rPr>
-              <a:t>Text :" + text</a:t>
+              <a:t>'</a:t>
             </a:r>
             <a:r>
               <a:rPr lang="en-US" b="1" noProof="1" smtClean="0">
@@ -22290,19 +24061,8 @@
                 <a:latin typeface="Consolas" pitchFamily="49" charset="0"/>
                 <a:cs typeface="Consolas" pitchFamily="49" charset="0"/>
               </a:rPr>
-              <a:t>);</a:t>
-            </a:r>
-          </a:p>
-          <a:p>
-            <a:pPr eaLnBrk="0" hangingPunct="0">
-              <a:buClr>
-                <a:schemeClr val="accent5">
-                  <a:lumMod val="40000"/>
-                  <a:lumOff val="60000"/>
-                </a:schemeClr>
-              </a:buClr>
-              <a:buSzPct val="70000"/>
-            </a:pPr>
+              <a:t>Number :</a:t>
+            </a:r>
             <a:r>
               <a:rPr lang="en-US" b="1" noProof="1">
                 <a:solidFill>
@@ -22318,26 +24078,26 @@
                 <a:latin typeface="Consolas" pitchFamily="49" charset="0"/>
                 <a:cs typeface="Consolas" pitchFamily="49" charset="0"/>
               </a:rPr>
+              <a:t>'</a:t>
+            </a:r>
+            <a:r>
+              <a:rPr lang="en-US" b="1" noProof="1" smtClean="0">
+                <a:solidFill>
+                  <a:srgbClr val="8CF4F2"/>
+                </a:solidFill>
+                <a:effectLst>
+                  <a:outerShdw blurRad="38100" dist="38100" dir="2700000" algn="tl">
+                    <a:srgbClr val="000000">
+                      <a:alpha val="43137"/>
+                    </a:srgbClr>
+                  </a:outerShdw>
+                </a:effectLst>
+                <a:latin typeface="Consolas" pitchFamily="49" charset="0"/>
+                <a:cs typeface="Consolas" pitchFamily="49" charset="0"/>
+              </a:rPr>
               <a:t> </a:t>
             </a:r>
             <a:r>
-              <a:rPr lang="en-US" b="1" noProof="1" smtClean="0">
-                <a:solidFill>
-                  <a:srgbClr val="8CF4F2"/>
-                </a:solidFill>
-                <a:effectLst>
-                  <a:outerShdw blurRad="38100" dist="38100" dir="2700000" algn="tl">
-                    <a:srgbClr val="000000">
-                      <a:alpha val="43137"/>
-                    </a:srgbClr>
-                  </a:outerShdw>
-                </a:effectLst>
-                <a:latin typeface="Consolas" pitchFamily="49" charset="0"/>
-                <a:cs typeface="Consolas" pitchFamily="49" charset="0"/>
-              </a:rPr>
-              <a:t>     break</a:t>
-            </a:r>
-            <a:r>
               <a:rPr lang="en-US" b="1" noProof="1">
                 <a:solidFill>
                   <a:srgbClr val="8CF4F2"/>
@@ -22352,7 +24112,7 @@
                 <a:latin typeface="Consolas" pitchFamily="49" charset="0"/>
                 <a:cs typeface="Consolas" pitchFamily="49" charset="0"/>
               </a:rPr>
-              <a:t>;			</a:t>
+              <a:t>+ number); </a:t>
             </a:r>
             <a:endParaRPr lang="en-US" b="1" noProof="1" smtClean="0">
               <a:solidFill>
@@ -22411,6 +24171,246 @@
                 <a:latin typeface="Consolas" pitchFamily="49" charset="0"/>
                 <a:cs typeface="Consolas" pitchFamily="49" charset="0"/>
               </a:rPr>
+              <a:t>     console.log </a:t>
+            </a:r>
+            <a:r>
+              <a:rPr lang="en-US" b="1" noProof="1" smtClean="0">
+                <a:solidFill>
+                  <a:srgbClr val="8CF4F2"/>
+                </a:solidFill>
+                <a:effectLst>
+                  <a:outerShdw blurRad="38100" dist="38100" dir="2700000" algn="tl">
+                    <a:srgbClr val="000000">
+                      <a:alpha val="43137"/>
+                    </a:srgbClr>
+                  </a:outerShdw>
+                </a:effectLst>
+                <a:latin typeface="Consolas" pitchFamily="49" charset="0"/>
+                <a:cs typeface="Consolas" pitchFamily="49" charset="0"/>
+              </a:rPr>
+              <a:t>(</a:t>
+            </a:r>
+            <a:r>
+              <a:rPr lang="en-US" b="1" noProof="1">
+                <a:solidFill>
+                  <a:srgbClr val="8CF4F2"/>
+                </a:solidFill>
+                <a:effectLst>
+                  <a:outerShdw blurRad="38100" dist="38100" dir="2700000" algn="tl">
+                    <a:srgbClr val="000000">
+                      <a:alpha val="43137"/>
+                    </a:srgbClr>
+                  </a:outerShdw>
+                </a:effectLst>
+                <a:latin typeface="Consolas" pitchFamily="49" charset="0"/>
+                <a:cs typeface="Consolas" pitchFamily="49" charset="0"/>
+              </a:rPr>
+              <a:t>'</a:t>
+            </a:r>
+            <a:r>
+              <a:rPr lang="en-US" b="1" noProof="1" smtClean="0">
+                <a:solidFill>
+                  <a:srgbClr val="8CF4F2"/>
+                </a:solidFill>
+                <a:effectLst>
+                  <a:outerShdw blurRad="38100" dist="38100" dir="2700000" algn="tl">
+                    <a:srgbClr val="000000">
+                      <a:alpha val="43137"/>
+                    </a:srgbClr>
+                  </a:outerShdw>
+                </a:effectLst>
+                <a:latin typeface="Consolas" pitchFamily="49" charset="0"/>
+                <a:cs typeface="Consolas" pitchFamily="49" charset="0"/>
+              </a:rPr>
+              <a:t>Text :</a:t>
+            </a:r>
+            <a:r>
+              <a:rPr lang="en-US" b="1" noProof="1">
+                <a:solidFill>
+                  <a:srgbClr val="8CF4F2"/>
+                </a:solidFill>
+                <a:effectLst>
+                  <a:outerShdw blurRad="38100" dist="38100" dir="2700000" algn="tl">
+                    <a:srgbClr val="000000">
+                      <a:alpha val="43137"/>
+                    </a:srgbClr>
+                  </a:outerShdw>
+                </a:effectLst>
+                <a:latin typeface="Consolas" pitchFamily="49" charset="0"/>
+                <a:cs typeface="Consolas" pitchFamily="49" charset="0"/>
+              </a:rPr>
+              <a:t>'</a:t>
+            </a:r>
+            <a:r>
+              <a:rPr lang="en-US" b="1" noProof="1" smtClean="0">
+                <a:solidFill>
+                  <a:srgbClr val="8CF4F2"/>
+                </a:solidFill>
+                <a:effectLst>
+                  <a:outerShdw blurRad="38100" dist="38100" dir="2700000" algn="tl">
+                    <a:srgbClr val="000000">
+                      <a:alpha val="43137"/>
+                    </a:srgbClr>
+                  </a:outerShdw>
+                </a:effectLst>
+                <a:latin typeface="Consolas" pitchFamily="49" charset="0"/>
+                <a:cs typeface="Consolas" pitchFamily="49" charset="0"/>
+              </a:rPr>
+              <a:t> </a:t>
+            </a:r>
+            <a:r>
+              <a:rPr lang="en-US" b="1" noProof="1">
+                <a:solidFill>
+                  <a:srgbClr val="8CF4F2"/>
+                </a:solidFill>
+                <a:effectLst>
+                  <a:outerShdw blurRad="38100" dist="38100" dir="2700000" algn="tl">
+                    <a:srgbClr val="000000">
+                      <a:alpha val="43137"/>
+                    </a:srgbClr>
+                  </a:outerShdw>
+                </a:effectLst>
+                <a:latin typeface="Consolas" pitchFamily="49" charset="0"/>
+                <a:cs typeface="Consolas" pitchFamily="49" charset="0"/>
+              </a:rPr>
+              <a:t>+ text</a:t>
+            </a:r>
+            <a:r>
+              <a:rPr lang="en-US" b="1" noProof="1" smtClean="0">
+                <a:solidFill>
+                  <a:srgbClr val="8CF4F2"/>
+                </a:solidFill>
+                <a:effectLst>
+                  <a:outerShdw blurRad="38100" dist="38100" dir="2700000" algn="tl">
+                    <a:srgbClr val="000000">
+                      <a:alpha val="43137"/>
+                    </a:srgbClr>
+                  </a:outerShdw>
+                </a:effectLst>
+                <a:latin typeface="Consolas" pitchFamily="49" charset="0"/>
+                <a:cs typeface="Consolas" pitchFamily="49" charset="0"/>
+              </a:rPr>
+              <a:t>);</a:t>
+            </a:r>
+          </a:p>
+          <a:p>
+            <a:pPr eaLnBrk="0" hangingPunct="0">
+              <a:buClr>
+                <a:schemeClr val="accent5">
+                  <a:lumMod val="40000"/>
+                  <a:lumOff val="60000"/>
+                </a:schemeClr>
+              </a:buClr>
+              <a:buSzPct val="70000"/>
+            </a:pPr>
+            <a:r>
+              <a:rPr lang="en-US" b="1" noProof="1">
+                <a:solidFill>
+                  <a:srgbClr val="8CF4F2"/>
+                </a:solidFill>
+                <a:effectLst>
+                  <a:outerShdw blurRad="38100" dist="38100" dir="2700000" algn="tl">
+                    <a:srgbClr val="000000">
+                      <a:alpha val="43137"/>
+                    </a:srgbClr>
+                  </a:outerShdw>
+                </a:effectLst>
+                <a:latin typeface="Consolas" pitchFamily="49" charset="0"/>
+                <a:cs typeface="Consolas" pitchFamily="49" charset="0"/>
+              </a:rPr>
+              <a:t> </a:t>
+            </a:r>
+            <a:r>
+              <a:rPr lang="en-US" b="1" noProof="1" smtClean="0">
+                <a:solidFill>
+                  <a:srgbClr val="8CF4F2"/>
+                </a:solidFill>
+                <a:effectLst>
+                  <a:outerShdw blurRad="38100" dist="38100" dir="2700000" algn="tl">
+                    <a:srgbClr val="000000">
+                      <a:alpha val="43137"/>
+                    </a:srgbClr>
+                  </a:outerShdw>
+                </a:effectLst>
+                <a:latin typeface="Consolas" pitchFamily="49" charset="0"/>
+                <a:cs typeface="Consolas" pitchFamily="49" charset="0"/>
+              </a:rPr>
+              <a:t>     break</a:t>
+            </a:r>
+            <a:r>
+              <a:rPr lang="en-US" b="1" noProof="1">
+                <a:solidFill>
+                  <a:srgbClr val="8CF4F2"/>
+                </a:solidFill>
+                <a:effectLst>
+                  <a:outerShdw blurRad="38100" dist="38100" dir="2700000" algn="tl">
+                    <a:srgbClr val="000000">
+                      <a:alpha val="43137"/>
+                    </a:srgbClr>
+                  </a:outerShdw>
+                </a:effectLst>
+                <a:latin typeface="Consolas" pitchFamily="49" charset="0"/>
+                <a:cs typeface="Consolas" pitchFamily="49" charset="0"/>
+              </a:rPr>
+              <a:t>;			</a:t>
+            </a:r>
+            <a:endParaRPr lang="en-US" b="1" noProof="1" smtClean="0">
+              <a:solidFill>
+                <a:srgbClr val="8CF4F2"/>
+              </a:solidFill>
+              <a:effectLst>
+                <a:outerShdw blurRad="38100" dist="38100" dir="2700000" algn="tl">
+                  <a:srgbClr val="000000">
+                    <a:alpha val="43137"/>
+                  </a:srgbClr>
+                </a:outerShdw>
+              </a:effectLst>
+              <a:latin typeface="Consolas" pitchFamily="49" charset="0"/>
+              <a:cs typeface="Consolas" pitchFamily="49" charset="0"/>
+            </a:endParaRPr>
+          </a:p>
+          <a:p>
+            <a:pPr eaLnBrk="0" hangingPunct="0">
+              <a:buClr>
+                <a:schemeClr val="accent5">
+                  <a:lumMod val="40000"/>
+                  <a:lumOff val="60000"/>
+                </a:schemeClr>
+              </a:buClr>
+              <a:buSzPct val="70000"/>
+            </a:pPr>
+            <a:r>
+              <a:rPr lang="en-US" b="1" noProof="1">
+                <a:solidFill>
+                  <a:srgbClr val="8CF4F2"/>
+                </a:solidFill>
+                <a:effectLst>
+                  <a:outerShdw blurRad="38100" dist="38100" dir="2700000" algn="tl">
+                    <a:srgbClr val="000000">
+                      <a:alpha val="43137"/>
+                    </a:srgbClr>
+                  </a:outerShdw>
+                </a:effectLst>
+                <a:latin typeface="Consolas" pitchFamily="49" charset="0"/>
+                <a:cs typeface="Consolas" pitchFamily="49" charset="0"/>
+              </a:rPr>
+              <a:t> </a:t>
+            </a:r>
+            <a:r>
+              <a:rPr lang="en-US" b="1" noProof="1" smtClean="0">
+                <a:solidFill>
+                  <a:srgbClr val="8CF4F2"/>
+                </a:solidFill>
+                <a:effectLst>
+                  <a:outerShdw blurRad="38100" dist="38100" dir="2700000" algn="tl">
+                    <a:srgbClr val="000000">
+                      <a:alpha val="43137"/>
+                    </a:srgbClr>
+                  </a:outerShdw>
+                </a:effectLst>
+                <a:latin typeface="Consolas" pitchFamily="49" charset="0"/>
+                <a:cs typeface="Consolas" pitchFamily="49" charset="0"/>
+              </a:rPr>
               <a:t> }</a:t>
             </a:r>
             <a:endParaRPr lang="en-US" b="1" noProof="1">
@@ -22574,7 +24574,126 @@
                 <a:latin typeface="Consolas" pitchFamily="49" charset="0"/>
                 <a:cs typeface="Consolas" pitchFamily="49" charset="0"/>
               </a:rPr>
-              <a:t>printText (5,"Lorem Ipsum"); //logs 5 and Lorem Ipsum</a:t>
+              <a:t>printText (5</a:t>
+            </a:r>
+            <a:r>
+              <a:rPr lang="en-US" b="1" noProof="1" smtClean="0">
+                <a:solidFill>
+                  <a:srgbClr val="8CF4F2"/>
+                </a:solidFill>
+                <a:effectLst>
+                  <a:outerShdw blurRad="38100" dist="38100" dir="2700000" algn="tl">
+                    <a:srgbClr val="000000">
+                      <a:alpha val="43137"/>
+                    </a:srgbClr>
+                  </a:outerShdw>
+                </a:effectLst>
+                <a:latin typeface="Consolas" pitchFamily="49" charset="0"/>
+                <a:cs typeface="Consolas" pitchFamily="49" charset="0"/>
+              </a:rPr>
+              <a:t>,</a:t>
+            </a:r>
+            <a:r>
+              <a:rPr lang="en-US" b="1" noProof="1">
+                <a:solidFill>
+                  <a:srgbClr val="8CF4F2"/>
+                </a:solidFill>
+                <a:effectLst>
+                  <a:outerShdw blurRad="38100" dist="38100" dir="2700000" algn="tl">
+                    <a:srgbClr val="000000">
+                      <a:alpha val="43137"/>
+                    </a:srgbClr>
+                  </a:outerShdw>
+                </a:effectLst>
+                <a:latin typeface="Consolas" pitchFamily="49" charset="0"/>
+                <a:cs typeface="Consolas" pitchFamily="49" charset="0"/>
+              </a:rPr>
+              <a:t> </a:t>
+            </a:r>
+            <a:r>
+              <a:rPr lang="en-US" b="1" noProof="1">
+                <a:solidFill>
+                  <a:srgbClr val="8CF4F2"/>
+                </a:solidFill>
+                <a:effectLst>
+                  <a:outerShdw blurRad="38100" dist="38100" dir="2700000" algn="tl">
+                    <a:srgbClr val="000000">
+                      <a:alpha val="43137"/>
+                    </a:srgbClr>
+                  </a:outerShdw>
+                </a:effectLst>
+                <a:latin typeface="Consolas" pitchFamily="49" charset="0"/>
+                <a:cs typeface="Consolas" pitchFamily="49" charset="0"/>
+              </a:rPr>
+              <a:t>'</a:t>
+            </a:r>
+            <a:r>
+              <a:rPr lang="en-US" b="1" noProof="1" smtClean="0">
+                <a:solidFill>
+                  <a:srgbClr val="8CF4F2"/>
+                </a:solidFill>
+                <a:effectLst>
+                  <a:outerShdw blurRad="38100" dist="38100" dir="2700000" algn="tl">
+                    <a:srgbClr val="000000">
+                      <a:alpha val="43137"/>
+                    </a:srgbClr>
+                  </a:outerShdw>
+                </a:effectLst>
+                <a:latin typeface="Consolas" pitchFamily="49" charset="0"/>
+                <a:cs typeface="Consolas" pitchFamily="49" charset="0"/>
+              </a:rPr>
+              <a:t>Lorem Ipsum</a:t>
+            </a:r>
+            <a:r>
+              <a:rPr lang="en-US" b="1" noProof="1">
+                <a:solidFill>
+                  <a:srgbClr val="8CF4F2"/>
+                </a:solidFill>
+                <a:effectLst>
+                  <a:outerShdw blurRad="38100" dist="38100" dir="2700000" algn="tl">
+                    <a:srgbClr val="000000">
+                      <a:alpha val="43137"/>
+                    </a:srgbClr>
+                  </a:outerShdw>
+                </a:effectLst>
+                <a:latin typeface="Consolas" pitchFamily="49" charset="0"/>
+                <a:cs typeface="Consolas" pitchFamily="49" charset="0"/>
+              </a:rPr>
+              <a:t>'</a:t>
+            </a:r>
+            <a:r>
+              <a:rPr lang="en-US" b="1" noProof="1" smtClean="0">
+                <a:solidFill>
+                  <a:srgbClr val="8CF4F2"/>
+                </a:solidFill>
+                <a:effectLst>
+                  <a:outerShdw blurRad="38100" dist="38100" dir="2700000" algn="tl">
+                    <a:srgbClr val="000000">
+                      <a:alpha val="43137"/>
+                    </a:srgbClr>
+                  </a:outerShdw>
+                </a:effectLst>
+                <a:latin typeface="Consolas" pitchFamily="49" charset="0"/>
+                <a:cs typeface="Consolas" pitchFamily="49" charset="0"/>
+              </a:rPr>
+              <a:t>); </a:t>
+            </a:r>
+            <a:r>
+              <a:rPr lang="en-US" b="1" noProof="1" smtClean="0">
+                <a:solidFill>
+                  <a:srgbClr val="8CF4F2"/>
+                </a:solidFill>
+                <a:effectLst>
+                  <a:outerShdw blurRad="38100" dist="38100" dir="2700000" algn="tl">
+                    <a:srgbClr val="000000">
+                      <a:alpha val="43137"/>
+                    </a:srgbClr>
+                  </a:outerShdw>
+                </a:effectLst>
+                <a:latin typeface="Consolas" pitchFamily="49" charset="0"/>
+                <a:cs typeface="Consolas" pitchFamily="49" charset="0"/>
+              </a:rPr>
+              <a:t>//logs 5 and Lorem Ipsum</a:t>
             </a:r>
             <a:endParaRPr lang="en-US" b="1" noProof="1">
               <a:solidFill>
@@ -22879,8 +24998,39 @@
                 <a:latin typeface="Consolas" pitchFamily="49" charset="0"/>
                 <a:cs typeface="Consolas" pitchFamily="49" charset="0"/>
               </a:rPr>
-              <a:t>value){</a:t>
-            </a:r>
+              <a:t>value</a:t>
+            </a:r>
+            <a:r>
+              <a:rPr lang="en-US" b="1" noProof="1" smtClean="0">
+                <a:solidFill>
+                  <a:srgbClr val="8CF4F2"/>
+                </a:solidFill>
+                <a:effectLst>
+                  <a:outerShdw blurRad="38100" dist="38100" dir="2700000" algn="tl">
+                    <a:srgbClr val="000000">
+                      <a:alpha val="43137"/>
+                    </a:srgbClr>
+                  </a:outerShdw>
+                </a:effectLst>
+                <a:latin typeface="Consolas" pitchFamily="49" charset="0"/>
+                <a:cs typeface="Consolas" pitchFamily="49" charset="0"/>
+              </a:rPr>
+              <a:t>) {</a:t>
+            </a:r>
+            <a:endParaRPr lang="en-US" b="1" noProof="1">
+              <a:solidFill>
+                <a:srgbClr val="8CF4F2"/>
+              </a:solidFill>
+              <a:effectLst>
+                <a:outerShdw blurRad="38100" dist="38100" dir="2700000" algn="tl">
+                  <a:srgbClr val="000000">
+                    <a:alpha val="43137"/>
+                  </a:srgbClr>
+                </a:outerShdw>
+              </a:effectLst>
+              <a:latin typeface="Consolas" pitchFamily="49" charset="0"/>
+              <a:cs typeface="Consolas" pitchFamily="49" charset="0"/>
+            </a:endParaRPr>
           </a:p>
           <a:p>
             <a:pPr eaLnBrk="0" hangingPunct="0">
@@ -22969,8 +25119,39 @@
                 <a:latin typeface="Consolas" pitchFamily="49" charset="0"/>
                 <a:cs typeface="Consolas" pitchFamily="49" charset="0"/>
               </a:rPr>
-              <a:t>typeof value){</a:t>
-            </a:r>
+              <a:t>typeof value</a:t>
+            </a:r>
+            <a:r>
+              <a:rPr lang="en-US" b="1" noProof="1" smtClean="0">
+                <a:solidFill>
+                  <a:srgbClr val="8CF4F2"/>
+                </a:solidFill>
+                <a:effectLst>
+                  <a:outerShdw blurRad="38100" dist="38100" dir="2700000" algn="tl">
+                    <a:srgbClr val="000000">
+                      <a:alpha val="43137"/>
+                    </a:srgbClr>
+                  </a:outerShdw>
+                </a:effectLst>
+                <a:latin typeface="Consolas" pitchFamily="49" charset="0"/>
+                <a:cs typeface="Consolas" pitchFamily="49" charset="0"/>
+              </a:rPr>
+              <a:t>) {</a:t>
+            </a:r>
+            <a:endParaRPr lang="en-US" b="1" noProof="1">
+              <a:solidFill>
+                <a:srgbClr val="8CF4F2"/>
+              </a:solidFill>
+              <a:effectLst>
+                <a:outerShdw blurRad="38100" dist="38100" dir="2700000" algn="tl">
+                  <a:srgbClr val="000000">
+                    <a:alpha val="43137"/>
+                  </a:srgbClr>
+                </a:outerShdw>
+              </a:effectLst>
+              <a:latin typeface="Consolas" pitchFamily="49" charset="0"/>
+              <a:cs typeface="Consolas" pitchFamily="49" charset="0"/>
+            </a:endParaRPr>
           </a:p>
           <a:p>
             <a:pPr eaLnBrk="0" hangingPunct="0">
@@ -23031,7 +25212,7 @@
                 <a:latin typeface="Consolas" pitchFamily="49" charset="0"/>
                 <a:cs typeface="Consolas" pitchFamily="49" charset="0"/>
               </a:rPr>
-              <a:t>"number" : </a:t>
+              <a:t>'</a:t>
             </a:r>
             <a:r>
               <a:rPr lang="en-US" b="1" noProof="1" smtClean="0">
@@ -23048,7 +25229,7 @@
                 <a:latin typeface="Consolas" pitchFamily="49" charset="0"/>
                 <a:cs typeface="Consolas" pitchFamily="49" charset="0"/>
               </a:rPr>
-              <a:t>log ("</a:t>
+              <a:t>number</a:t>
             </a:r>
             <a:r>
               <a:rPr lang="en-US" b="1" noProof="1">
@@ -23065,7 +25246,211 @@
                 <a:latin typeface="Consolas" pitchFamily="49" charset="0"/>
                 <a:cs typeface="Consolas" pitchFamily="49" charset="0"/>
               </a:rPr>
-              <a:t>Number: " + value);break;</a:t>
+              <a:t>'</a:t>
+            </a:r>
+            <a:r>
+              <a:rPr lang="en-US" b="1" noProof="1" smtClean="0">
+                <a:solidFill>
+                  <a:srgbClr val="8CF4F2"/>
+                </a:solidFill>
+                <a:effectLst>
+                  <a:outerShdw blurRad="38100" dist="38100" dir="2700000" algn="tl">
+                    <a:srgbClr val="000000">
+                      <a:alpha val="43137"/>
+                    </a:srgbClr>
+                  </a:outerShdw>
+                </a:effectLst>
+                <a:latin typeface="Consolas" pitchFamily="49" charset="0"/>
+                <a:cs typeface="Consolas" pitchFamily="49" charset="0"/>
+              </a:rPr>
+              <a:t> </a:t>
+            </a:r>
+            <a:r>
+              <a:rPr lang="en-US" b="1" noProof="1">
+                <a:solidFill>
+                  <a:srgbClr val="8CF4F2"/>
+                </a:solidFill>
+                <a:effectLst>
+                  <a:outerShdw blurRad="38100" dist="38100" dir="2700000" algn="tl">
+                    <a:srgbClr val="000000">
+                      <a:alpha val="43137"/>
+                    </a:srgbClr>
+                  </a:outerShdw>
+                </a:effectLst>
+                <a:latin typeface="Consolas" pitchFamily="49" charset="0"/>
+                <a:cs typeface="Consolas" pitchFamily="49" charset="0"/>
+              </a:rPr>
+              <a:t>: </a:t>
+            </a:r>
+            <a:r>
+              <a:rPr lang="en-US" b="1" noProof="1" smtClean="0">
+                <a:solidFill>
+                  <a:srgbClr val="8CF4F2"/>
+                </a:solidFill>
+                <a:effectLst>
+                  <a:outerShdw blurRad="38100" dist="38100" dir="2700000" algn="tl">
+                    <a:srgbClr val="000000">
+                      <a:alpha val="43137"/>
+                    </a:srgbClr>
+                  </a:outerShdw>
+                </a:effectLst>
+                <a:latin typeface="Consolas" pitchFamily="49" charset="0"/>
+                <a:cs typeface="Consolas" pitchFamily="49" charset="0"/>
+              </a:rPr>
+              <a:t>log </a:t>
+            </a:r>
+            <a:r>
+              <a:rPr lang="en-US" b="1" noProof="1" smtClean="0">
+                <a:solidFill>
+                  <a:srgbClr val="8CF4F2"/>
+                </a:solidFill>
+                <a:effectLst>
+                  <a:outerShdw blurRad="38100" dist="38100" dir="2700000" algn="tl">
+                    <a:srgbClr val="000000">
+                      <a:alpha val="43137"/>
+                    </a:srgbClr>
+                  </a:outerShdw>
+                </a:effectLst>
+                <a:latin typeface="Consolas" pitchFamily="49" charset="0"/>
+                <a:cs typeface="Consolas" pitchFamily="49" charset="0"/>
+              </a:rPr>
+              <a:t>(</a:t>
+            </a:r>
+            <a:r>
+              <a:rPr lang="en-US" b="1" noProof="1">
+                <a:solidFill>
+                  <a:srgbClr val="8CF4F2"/>
+                </a:solidFill>
+                <a:effectLst>
+                  <a:outerShdw blurRad="38100" dist="38100" dir="2700000" algn="tl">
+                    <a:srgbClr val="000000">
+                      <a:alpha val="43137"/>
+                    </a:srgbClr>
+                  </a:outerShdw>
+                </a:effectLst>
+                <a:latin typeface="Consolas" pitchFamily="49" charset="0"/>
+                <a:cs typeface="Consolas" pitchFamily="49" charset="0"/>
+              </a:rPr>
+              <a:t>'</a:t>
+            </a:r>
+            <a:r>
+              <a:rPr lang="en-US" b="1" noProof="1" smtClean="0">
+                <a:solidFill>
+                  <a:srgbClr val="8CF4F2"/>
+                </a:solidFill>
+                <a:effectLst>
+                  <a:outerShdw blurRad="38100" dist="38100" dir="2700000" algn="tl">
+                    <a:srgbClr val="000000">
+                      <a:alpha val="43137"/>
+                    </a:srgbClr>
+                  </a:outerShdw>
+                </a:effectLst>
+                <a:latin typeface="Consolas" pitchFamily="49" charset="0"/>
+                <a:cs typeface="Consolas" pitchFamily="49" charset="0"/>
+              </a:rPr>
+              <a:t>Number</a:t>
+            </a:r>
+            <a:r>
+              <a:rPr lang="en-US" b="1" noProof="1">
+                <a:solidFill>
+                  <a:srgbClr val="8CF4F2"/>
+                </a:solidFill>
+                <a:effectLst>
+                  <a:outerShdw blurRad="38100" dist="38100" dir="2700000" algn="tl">
+                    <a:srgbClr val="000000">
+                      <a:alpha val="43137"/>
+                    </a:srgbClr>
+                  </a:outerShdw>
+                </a:effectLst>
+                <a:latin typeface="Consolas" pitchFamily="49" charset="0"/>
+                <a:cs typeface="Consolas" pitchFamily="49" charset="0"/>
+              </a:rPr>
+              <a:t>: </a:t>
+            </a:r>
+            <a:r>
+              <a:rPr lang="en-US" b="1" noProof="1">
+                <a:solidFill>
+                  <a:srgbClr val="8CF4F2"/>
+                </a:solidFill>
+                <a:effectLst>
+                  <a:outerShdw blurRad="38100" dist="38100" dir="2700000" algn="tl">
+                    <a:srgbClr val="000000">
+                      <a:alpha val="43137"/>
+                    </a:srgbClr>
+                  </a:outerShdw>
+                </a:effectLst>
+                <a:latin typeface="Consolas" pitchFamily="49" charset="0"/>
+                <a:cs typeface="Consolas" pitchFamily="49" charset="0"/>
+              </a:rPr>
+              <a:t>'</a:t>
+            </a:r>
+            <a:r>
+              <a:rPr lang="en-US" b="1" noProof="1" smtClean="0">
+                <a:solidFill>
+                  <a:srgbClr val="8CF4F2"/>
+                </a:solidFill>
+                <a:effectLst>
+                  <a:outerShdw blurRad="38100" dist="38100" dir="2700000" algn="tl">
+                    <a:srgbClr val="000000">
+                      <a:alpha val="43137"/>
+                    </a:srgbClr>
+                  </a:outerShdw>
+                </a:effectLst>
+                <a:latin typeface="Consolas" pitchFamily="49" charset="0"/>
+                <a:cs typeface="Consolas" pitchFamily="49" charset="0"/>
+              </a:rPr>
+              <a:t> </a:t>
+            </a:r>
+            <a:r>
+              <a:rPr lang="en-US" b="1" noProof="1">
+                <a:solidFill>
+                  <a:srgbClr val="8CF4F2"/>
+                </a:solidFill>
+                <a:effectLst>
+                  <a:outerShdw blurRad="38100" dist="38100" dir="2700000" algn="tl">
+                    <a:srgbClr val="000000">
+                      <a:alpha val="43137"/>
+                    </a:srgbClr>
+                  </a:outerShdw>
+                </a:effectLst>
+                <a:latin typeface="Consolas" pitchFamily="49" charset="0"/>
+                <a:cs typeface="Consolas" pitchFamily="49" charset="0"/>
+              </a:rPr>
+              <a:t>+ value</a:t>
+            </a:r>
+            <a:r>
+              <a:rPr lang="en-US" b="1" noProof="1" smtClean="0">
+                <a:solidFill>
+                  <a:srgbClr val="8CF4F2"/>
+                </a:solidFill>
+                <a:effectLst>
+                  <a:outerShdw blurRad="38100" dist="38100" dir="2700000" algn="tl">
+                    <a:srgbClr val="000000">
+                      <a:alpha val="43137"/>
+                    </a:srgbClr>
+                  </a:outerShdw>
+                </a:effectLst>
+                <a:latin typeface="Consolas" pitchFamily="49" charset="0"/>
+                <a:cs typeface="Consolas" pitchFamily="49" charset="0"/>
+              </a:rPr>
+              <a:t>); break</a:t>
+            </a:r>
+            <a:r>
+              <a:rPr lang="en-US" b="1" noProof="1">
+                <a:solidFill>
+                  <a:srgbClr val="8CF4F2"/>
+                </a:solidFill>
+                <a:effectLst>
+                  <a:outerShdw blurRad="38100" dist="38100" dir="2700000" algn="tl">
+                    <a:srgbClr val="000000">
+                      <a:alpha val="43137"/>
+                    </a:srgbClr>
+                  </a:outerShdw>
+                </a:effectLst>
+                <a:latin typeface="Consolas" pitchFamily="49" charset="0"/>
+                <a:cs typeface="Consolas" pitchFamily="49" charset="0"/>
+              </a:rPr>
+              <a:t>;</a:t>
             </a:r>
           </a:p>
           <a:p>
@@ -23127,7 +25512,7 @@
                 <a:latin typeface="Consolas" pitchFamily="49" charset="0"/>
                 <a:cs typeface="Consolas" pitchFamily="49" charset="0"/>
               </a:rPr>
-              <a:t>"string" : </a:t>
+              <a:t>'</a:t>
             </a:r>
             <a:r>
               <a:rPr lang="en-US" b="1" noProof="1" smtClean="0">
@@ -23144,7 +25529,7 @@
                 <a:latin typeface="Consolas" pitchFamily="49" charset="0"/>
                 <a:cs typeface="Consolas" pitchFamily="49" charset="0"/>
               </a:rPr>
-              <a:t>log ("</a:t>
+              <a:t>string</a:t>
             </a:r>
             <a:r>
               <a:rPr lang="en-US" b="1" noProof="1">
@@ -23161,7 +25546,211 @@
                 <a:latin typeface="Consolas" pitchFamily="49" charset="0"/>
                 <a:cs typeface="Consolas" pitchFamily="49" charset="0"/>
               </a:rPr>
-              <a:t>String: " + value);break;</a:t>
+              <a:t>'</a:t>
+            </a:r>
+            <a:r>
+              <a:rPr lang="en-US" b="1" noProof="1" smtClean="0">
+                <a:solidFill>
+                  <a:srgbClr val="8CF4F2"/>
+                </a:solidFill>
+                <a:effectLst>
+                  <a:outerShdw blurRad="38100" dist="38100" dir="2700000" algn="tl">
+                    <a:srgbClr val="000000">
+                      <a:alpha val="43137"/>
+                    </a:srgbClr>
+                  </a:outerShdw>
+                </a:effectLst>
+                <a:latin typeface="Consolas" pitchFamily="49" charset="0"/>
+                <a:cs typeface="Consolas" pitchFamily="49" charset="0"/>
+              </a:rPr>
+              <a:t> </a:t>
+            </a:r>
+            <a:r>
+              <a:rPr lang="en-US" b="1" noProof="1">
+                <a:solidFill>
+                  <a:srgbClr val="8CF4F2"/>
+                </a:solidFill>
+                <a:effectLst>
+                  <a:outerShdw blurRad="38100" dist="38100" dir="2700000" algn="tl">
+                    <a:srgbClr val="000000">
+                      <a:alpha val="43137"/>
+                    </a:srgbClr>
+                  </a:outerShdw>
+                </a:effectLst>
+                <a:latin typeface="Consolas" pitchFamily="49" charset="0"/>
+                <a:cs typeface="Consolas" pitchFamily="49" charset="0"/>
+              </a:rPr>
+              <a:t>: </a:t>
+            </a:r>
+            <a:r>
+              <a:rPr lang="en-US" b="1" noProof="1" smtClean="0">
+                <a:solidFill>
+                  <a:srgbClr val="8CF4F2"/>
+                </a:solidFill>
+                <a:effectLst>
+                  <a:outerShdw blurRad="38100" dist="38100" dir="2700000" algn="tl">
+                    <a:srgbClr val="000000">
+                      <a:alpha val="43137"/>
+                    </a:srgbClr>
+                  </a:outerShdw>
+                </a:effectLst>
+                <a:latin typeface="Consolas" pitchFamily="49" charset="0"/>
+                <a:cs typeface="Consolas" pitchFamily="49" charset="0"/>
+              </a:rPr>
+              <a:t>log </a:t>
+            </a:r>
+            <a:r>
+              <a:rPr lang="en-US" b="1" noProof="1" smtClean="0">
+                <a:solidFill>
+                  <a:srgbClr val="8CF4F2"/>
+                </a:solidFill>
+                <a:effectLst>
+                  <a:outerShdw blurRad="38100" dist="38100" dir="2700000" algn="tl">
+                    <a:srgbClr val="000000">
+                      <a:alpha val="43137"/>
+                    </a:srgbClr>
+                  </a:outerShdw>
+                </a:effectLst>
+                <a:latin typeface="Consolas" pitchFamily="49" charset="0"/>
+                <a:cs typeface="Consolas" pitchFamily="49" charset="0"/>
+              </a:rPr>
+              <a:t>(</a:t>
+            </a:r>
+            <a:r>
+              <a:rPr lang="en-US" b="1" noProof="1">
+                <a:solidFill>
+                  <a:srgbClr val="8CF4F2"/>
+                </a:solidFill>
+                <a:effectLst>
+                  <a:outerShdw blurRad="38100" dist="38100" dir="2700000" algn="tl">
+                    <a:srgbClr val="000000">
+                      <a:alpha val="43137"/>
+                    </a:srgbClr>
+                  </a:outerShdw>
+                </a:effectLst>
+                <a:latin typeface="Consolas" pitchFamily="49" charset="0"/>
+                <a:cs typeface="Consolas" pitchFamily="49" charset="0"/>
+              </a:rPr>
+              <a:t>'</a:t>
+            </a:r>
+            <a:r>
+              <a:rPr lang="en-US" b="1" noProof="1" smtClean="0">
+                <a:solidFill>
+                  <a:srgbClr val="8CF4F2"/>
+                </a:solidFill>
+                <a:effectLst>
+                  <a:outerShdw blurRad="38100" dist="38100" dir="2700000" algn="tl">
+                    <a:srgbClr val="000000">
+                      <a:alpha val="43137"/>
+                    </a:srgbClr>
+                  </a:outerShdw>
+                </a:effectLst>
+                <a:latin typeface="Consolas" pitchFamily="49" charset="0"/>
+                <a:cs typeface="Consolas" pitchFamily="49" charset="0"/>
+              </a:rPr>
+              <a:t>String</a:t>
+            </a:r>
+            <a:r>
+              <a:rPr lang="en-US" b="1" noProof="1">
+                <a:solidFill>
+                  <a:srgbClr val="8CF4F2"/>
+                </a:solidFill>
+                <a:effectLst>
+                  <a:outerShdw blurRad="38100" dist="38100" dir="2700000" algn="tl">
+                    <a:srgbClr val="000000">
+                      <a:alpha val="43137"/>
+                    </a:srgbClr>
+                  </a:outerShdw>
+                </a:effectLst>
+                <a:latin typeface="Consolas" pitchFamily="49" charset="0"/>
+                <a:cs typeface="Consolas" pitchFamily="49" charset="0"/>
+              </a:rPr>
+              <a:t>: </a:t>
+            </a:r>
+            <a:r>
+              <a:rPr lang="en-US" b="1" noProof="1">
+                <a:solidFill>
+                  <a:srgbClr val="8CF4F2"/>
+                </a:solidFill>
+                <a:effectLst>
+                  <a:outerShdw blurRad="38100" dist="38100" dir="2700000" algn="tl">
+                    <a:srgbClr val="000000">
+                      <a:alpha val="43137"/>
+                    </a:srgbClr>
+                  </a:outerShdw>
+                </a:effectLst>
+                <a:latin typeface="Consolas" pitchFamily="49" charset="0"/>
+                <a:cs typeface="Consolas" pitchFamily="49" charset="0"/>
+              </a:rPr>
+              <a:t>'</a:t>
+            </a:r>
+            <a:r>
+              <a:rPr lang="en-US" b="1" noProof="1" smtClean="0">
+                <a:solidFill>
+                  <a:srgbClr val="8CF4F2"/>
+                </a:solidFill>
+                <a:effectLst>
+                  <a:outerShdw blurRad="38100" dist="38100" dir="2700000" algn="tl">
+                    <a:srgbClr val="000000">
+                      <a:alpha val="43137"/>
+                    </a:srgbClr>
+                  </a:outerShdw>
+                </a:effectLst>
+                <a:latin typeface="Consolas" pitchFamily="49" charset="0"/>
+                <a:cs typeface="Consolas" pitchFamily="49" charset="0"/>
+              </a:rPr>
+              <a:t> </a:t>
+            </a:r>
+            <a:r>
+              <a:rPr lang="en-US" b="1" noProof="1">
+                <a:solidFill>
+                  <a:srgbClr val="8CF4F2"/>
+                </a:solidFill>
+                <a:effectLst>
+                  <a:outerShdw blurRad="38100" dist="38100" dir="2700000" algn="tl">
+                    <a:srgbClr val="000000">
+                      <a:alpha val="43137"/>
+                    </a:srgbClr>
+                  </a:outerShdw>
+                </a:effectLst>
+                <a:latin typeface="Consolas" pitchFamily="49" charset="0"/>
+                <a:cs typeface="Consolas" pitchFamily="49" charset="0"/>
+              </a:rPr>
+              <a:t>+ value</a:t>
+            </a:r>
+            <a:r>
+              <a:rPr lang="en-US" b="1" noProof="1" smtClean="0">
+                <a:solidFill>
+                  <a:srgbClr val="8CF4F2"/>
+                </a:solidFill>
+                <a:effectLst>
+                  <a:outerShdw blurRad="38100" dist="38100" dir="2700000" algn="tl">
+                    <a:srgbClr val="000000">
+                      <a:alpha val="43137"/>
+                    </a:srgbClr>
+                  </a:outerShdw>
+                </a:effectLst>
+                <a:latin typeface="Consolas" pitchFamily="49" charset="0"/>
+                <a:cs typeface="Consolas" pitchFamily="49" charset="0"/>
+              </a:rPr>
+              <a:t>); break</a:t>
+            </a:r>
+            <a:r>
+              <a:rPr lang="en-US" b="1" noProof="1">
+                <a:solidFill>
+                  <a:srgbClr val="8CF4F2"/>
+                </a:solidFill>
+                <a:effectLst>
+                  <a:outerShdw blurRad="38100" dist="38100" dir="2700000" algn="tl">
+                    <a:srgbClr val="000000">
+                      <a:alpha val="43137"/>
+                    </a:srgbClr>
+                  </a:outerShdw>
+                </a:effectLst>
+                <a:latin typeface="Consolas" pitchFamily="49" charset="0"/>
+                <a:cs typeface="Consolas" pitchFamily="49" charset="0"/>
+              </a:rPr>
+              <a:t>;</a:t>
             </a:r>
           </a:p>
           <a:p>
@@ -23223,7 +25812,7 @@
                 <a:latin typeface="Consolas" pitchFamily="49" charset="0"/>
                 <a:cs typeface="Consolas" pitchFamily="49" charset="0"/>
               </a:rPr>
-              <a:t>"object" : </a:t>
+              <a:t>'</a:t>
             </a:r>
             <a:r>
               <a:rPr lang="en-US" b="1" noProof="1" smtClean="0">
@@ -23240,7 +25829,7 @@
                 <a:latin typeface="Consolas" pitchFamily="49" charset="0"/>
                 <a:cs typeface="Consolas" pitchFamily="49" charset="0"/>
               </a:rPr>
-              <a:t>log ("</a:t>
+              <a:t>object</a:t>
             </a:r>
             <a:r>
               <a:rPr lang="en-US" b="1" noProof="1">
@@ -23257,7 +25846,211 @@
                 <a:latin typeface="Consolas" pitchFamily="49" charset="0"/>
                 <a:cs typeface="Consolas" pitchFamily="49" charset="0"/>
               </a:rPr>
-              <a:t>Object: " + value);break;</a:t>
+              <a:t>'</a:t>
+            </a:r>
+            <a:r>
+              <a:rPr lang="en-US" b="1" noProof="1" smtClean="0">
+                <a:solidFill>
+                  <a:srgbClr val="8CF4F2"/>
+                </a:solidFill>
+                <a:effectLst>
+                  <a:outerShdw blurRad="38100" dist="38100" dir="2700000" algn="tl">
+                    <a:srgbClr val="000000">
+                      <a:alpha val="43137"/>
+                    </a:srgbClr>
+                  </a:outerShdw>
+                </a:effectLst>
+                <a:latin typeface="Consolas" pitchFamily="49" charset="0"/>
+                <a:cs typeface="Consolas" pitchFamily="49" charset="0"/>
+              </a:rPr>
+              <a:t> </a:t>
+            </a:r>
+            <a:r>
+              <a:rPr lang="en-US" b="1" noProof="1">
+                <a:solidFill>
+                  <a:srgbClr val="8CF4F2"/>
+                </a:solidFill>
+                <a:effectLst>
+                  <a:outerShdw blurRad="38100" dist="38100" dir="2700000" algn="tl">
+                    <a:srgbClr val="000000">
+                      <a:alpha val="43137"/>
+                    </a:srgbClr>
+                  </a:outerShdw>
+                </a:effectLst>
+                <a:latin typeface="Consolas" pitchFamily="49" charset="0"/>
+                <a:cs typeface="Consolas" pitchFamily="49" charset="0"/>
+              </a:rPr>
+              <a:t>: </a:t>
+            </a:r>
+            <a:r>
+              <a:rPr lang="en-US" b="1" noProof="1" smtClean="0">
+                <a:solidFill>
+                  <a:srgbClr val="8CF4F2"/>
+                </a:solidFill>
+                <a:effectLst>
+                  <a:outerShdw blurRad="38100" dist="38100" dir="2700000" algn="tl">
+                    <a:srgbClr val="000000">
+                      <a:alpha val="43137"/>
+                    </a:srgbClr>
+                  </a:outerShdw>
+                </a:effectLst>
+                <a:latin typeface="Consolas" pitchFamily="49" charset="0"/>
+                <a:cs typeface="Consolas" pitchFamily="49" charset="0"/>
+              </a:rPr>
+              <a:t>log </a:t>
+            </a:r>
+            <a:r>
+              <a:rPr lang="en-US" b="1" noProof="1" smtClean="0">
+                <a:solidFill>
+                  <a:srgbClr val="8CF4F2"/>
+                </a:solidFill>
+                <a:effectLst>
+                  <a:outerShdw blurRad="38100" dist="38100" dir="2700000" algn="tl">
+                    <a:srgbClr val="000000">
+                      <a:alpha val="43137"/>
+                    </a:srgbClr>
+                  </a:outerShdw>
+                </a:effectLst>
+                <a:latin typeface="Consolas" pitchFamily="49" charset="0"/>
+                <a:cs typeface="Consolas" pitchFamily="49" charset="0"/>
+              </a:rPr>
+              <a:t>(</a:t>
+            </a:r>
+            <a:r>
+              <a:rPr lang="en-US" b="1" noProof="1">
+                <a:solidFill>
+                  <a:srgbClr val="8CF4F2"/>
+                </a:solidFill>
+                <a:effectLst>
+                  <a:outerShdw blurRad="38100" dist="38100" dir="2700000" algn="tl">
+                    <a:srgbClr val="000000">
+                      <a:alpha val="43137"/>
+                    </a:srgbClr>
+                  </a:outerShdw>
+                </a:effectLst>
+                <a:latin typeface="Consolas" pitchFamily="49" charset="0"/>
+                <a:cs typeface="Consolas" pitchFamily="49" charset="0"/>
+              </a:rPr>
+              <a:t>'</a:t>
+            </a:r>
+            <a:r>
+              <a:rPr lang="en-US" b="1" noProof="1" smtClean="0">
+                <a:solidFill>
+                  <a:srgbClr val="8CF4F2"/>
+                </a:solidFill>
+                <a:effectLst>
+                  <a:outerShdw blurRad="38100" dist="38100" dir="2700000" algn="tl">
+                    <a:srgbClr val="000000">
+                      <a:alpha val="43137"/>
+                    </a:srgbClr>
+                  </a:outerShdw>
+                </a:effectLst>
+                <a:latin typeface="Consolas" pitchFamily="49" charset="0"/>
+                <a:cs typeface="Consolas" pitchFamily="49" charset="0"/>
+              </a:rPr>
+              <a:t>Object</a:t>
+            </a:r>
+            <a:r>
+              <a:rPr lang="en-US" b="1" noProof="1">
+                <a:solidFill>
+                  <a:srgbClr val="8CF4F2"/>
+                </a:solidFill>
+                <a:effectLst>
+                  <a:outerShdw blurRad="38100" dist="38100" dir="2700000" algn="tl">
+                    <a:srgbClr val="000000">
+                      <a:alpha val="43137"/>
+                    </a:srgbClr>
+                  </a:outerShdw>
+                </a:effectLst>
+                <a:latin typeface="Consolas" pitchFamily="49" charset="0"/>
+                <a:cs typeface="Consolas" pitchFamily="49" charset="0"/>
+              </a:rPr>
+              <a:t>: </a:t>
+            </a:r>
+            <a:r>
+              <a:rPr lang="en-US" b="1" noProof="1">
+                <a:solidFill>
+                  <a:srgbClr val="8CF4F2"/>
+                </a:solidFill>
+                <a:effectLst>
+                  <a:outerShdw blurRad="38100" dist="38100" dir="2700000" algn="tl">
+                    <a:srgbClr val="000000">
+                      <a:alpha val="43137"/>
+                    </a:srgbClr>
+                  </a:outerShdw>
+                </a:effectLst>
+                <a:latin typeface="Consolas" pitchFamily="49" charset="0"/>
+                <a:cs typeface="Consolas" pitchFamily="49" charset="0"/>
+              </a:rPr>
+              <a:t>'</a:t>
+            </a:r>
+            <a:r>
+              <a:rPr lang="en-US" b="1" noProof="1" smtClean="0">
+                <a:solidFill>
+                  <a:srgbClr val="8CF4F2"/>
+                </a:solidFill>
+                <a:effectLst>
+                  <a:outerShdw blurRad="38100" dist="38100" dir="2700000" algn="tl">
+                    <a:srgbClr val="000000">
+                      <a:alpha val="43137"/>
+                    </a:srgbClr>
+                  </a:outerShdw>
+                </a:effectLst>
+                <a:latin typeface="Consolas" pitchFamily="49" charset="0"/>
+                <a:cs typeface="Consolas" pitchFamily="49" charset="0"/>
+              </a:rPr>
+              <a:t> </a:t>
+            </a:r>
+            <a:r>
+              <a:rPr lang="en-US" b="1" noProof="1">
+                <a:solidFill>
+                  <a:srgbClr val="8CF4F2"/>
+                </a:solidFill>
+                <a:effectLst>
+                  <a:outerShdw blurRad="38100" dist="38100" dir="2700000" algn="tl">
+                    <a:srgbClr val="000000">
+                      <a:alpha val="43137"/>
+                    </a:srgbClr>
+                  </a:outerShdw>
+                </a:effectLst>
+                <a:latin typeface="Consolas" pitchFamily="49" charset="0"/>
+                <a:cs typeface="Consolas" pitchFamily="49" charset="0"/>
+              </a:rPr>
+              <a:t>+ value</a:t>
+            </a:r>
+            <a:r>
+              <a:rPr lang="en-US" b="1" noProof="1" smtClean="0">
+                <a:solidFill>
+                  <a:srgbClr val="8CF4F2"/>
+                </a:solidFill>
+                <a:effectLst>
+                  <a:outerShdw blurRad="38100" dist="38100" dir="2700000" algn="tl">
+                    <a:srgbClr val="000000">
+                      <a:alpha val="43137"/>
+                    </a:srgbClr>
+                  </a:outerShdw>
+                </a:effectLst>
+                <a:latin typeface="Consolas" pitchFamily="49" charset="0"/>
+                <a:cs typeface="Consolas" pitchFamily="49" charset="0"/>
+              </a:rPr>
+              <a:t>); break</a:t>
+            </a:r>
+            <a:r>
+              <a:rPr lang="en-US" b="1" noProof="1">
+                <a:solidFill>
+                  <a:srgbClr val="8CF4F2"/>
+                </a:solidFill>
+                <a:effectLst>
+                  <a:outerShdw blurRad="38100" dist="38100" dir="2700000" algn="tl">
+                    <a:srgbClr val="000000">
+                      <a:alpha val="43137"/>
+                    </a:srgbClr>
+                  </a:outerShdw>
+                </a:effectLst>
+                <a:latin typeface="Consolas" pitchFamily="49" charset="0"/>
+                <a:cs typeface="Consolas" pitchFamily="49" charset="0"/>
+              </a:rPr>
+              <a:t>;</a:t>
             </a:r>
           </a:p>
           <a:p>
@@ -23305,6 +26098,40 @@
               <a:t>  case </a:t>
             </a:r>
             <a:r>
+              <a:rPr lang="en-US" b="1" noProof="1" smtClean="0">
+                <a:solidFill>
+                  <a:srgbClr val="8CF4F2"/>
+                </a:solidFill>
+                <a:effectLst>
+                  <a:outerShdw blurRad="38100" dist="38100" dir="2700000" algn="tl">
+                    <a:srgbClr val="000000">
+                      <a:alpha val="43137"/>
+                    </a:srgbClr>
+                  </a:outerShdw>
+                </a:effectLst>
+                <a:latin typeface="Consolas" pitchFamily="49" charset="0"/>
+                <a:cs typeface="Consolas" pitchFamily="49" charset="0"/>
+              </a:rPr>
+              <a:t>'</a:t>
+            </a:r>
+            <a:r>
+              <a:rPr lang="en-US" b="1" noProof="1" smtClean="0">
+                <a:solidFill>
+                  <a:srgbClr val="8CF4F2"/>
+                </a:solidFill>
+                <a:effectLst>
+                  <a:outerShdw blurRad="38100" dist="38100" dir="2700000" algn="tl">
+                    <a:srgbClr val="000000">
+                      <a:alpha val="43137"/>
+                    </a:srgbClr>
+                  </a:outerShdw>
+                </a:effectLst>
+                <a:latin typeface="Consolas" pitchFamily="49" charset="0"/>
+                <a:cs typeface="Consolas" pitchFamily="49" charset="0"/>
+              </a:rPr>
+              <a:t>boolean</a:t>
+            </a:r>
+            <a:r>
               <a:rPr lang="en-US" b="1" noProof="1">
                 <a:solidFill>
                   <a:srgbClr val="8CF4F2"/>
@@ -23319,7 +26146,7 @@
                 <a:latin typeface="Consolas" pitchFamily="49" charset="0"/>
                 <a:cs typeface="Consolas" pitchFamily="49" charset="0"/>
               </a:rPr>
-              <a:t>"boolean" : </a:t>
+              <a:t>'</a:t>
             </a:r>
             <a:r>
               <a:rPr lang="en-US" b="1" noProof="1" smtClean="0">
@@ -23336,7 +26163,7 @@
                 <a:latin typeface="Consolas" pitchFamily="49" charset="0"/>
                 <a:cs typeface="Consolas" pitchFamily="49" charset="0"/>
               </a:rPr>
-              <a:t>log ("</a:t>
+              <a:t> </a:t>
             </a:r>
             <a:r>
               <a:rPr lang="en-US" b="1" noProof="1">
@@ -23353,7 +26180,177 @@
                 <a:latin typeface="Consolas" pitchFamily="49" charset="0"/>
                 <a:cs typeface="Consolas" pitchFamily="49" charset="0"/>
               </a:rPr>
-              <a:t>Number: " + value);break;</a:t>
+              <a:t>: </a:t>
+            </a:r>
+            <a:r>
+              <a:rPr lang="en-US" b="1" noProof="1" smtClean="0">
+                <a:solidFill>
+                  <a:srgbClr val="8CF4F2"/>
+                </a:solidFill>
+                <a:effectLst>
+                  <a:outerShdw blurRad="38100" dist="38100" dir="2700000" algn="tl">
+                    <a:srgbClr val="000000">
+                      <a:alpha val="43137"/>
+                    </a:srgbClr>
+                  </a:outerShdw>
+                </a:effectLst>
+                <a:latin typeface="Consolas" pitchFamily="49" charset="0"/>
+                <a:cs typeface="Consolas" pitchFamily="49" charset="0"/>
+              </a:rPr>
+              <a:t>log </a:t>
+            </a:r>
+            <a:r>
+              <a:rPr lang="en-US" b="1" noProof="1" smtClean="0">
+                <a:solidFill>
+                  <a:srgbClr val="8CF4F2"/>
+                </a:solidFill>
+                <a:effectLst>
+                  <a:outerShdw blurRad="38100" dist="38100" dir="2700000" algn="tl">
+                    <a:srgbClr val="000000">
+                      <a:alpha val="43137"/>
+                    </a:srgbClr>
+                  </a:outerShdw>
+                </a:effectLst>
+                <a:latin typeface="Consolas" pitchFamily="49" charset="0"/>
+                <a:cs typeface="Consolas" pitchFamily="49" charset="0"/>
+              </a:rPr>
+              <a:t>(</a:t>
+            </a:r>
+            <a:r>
+              <a:rPr lang="en-US" b="1" noProof="1">
+                <a:solidFill>
+                  <a:srgbClr val="8CF4F2"/>
+                </a:solidFill>
+                <a:effectLst>
+                  <a:outerShdw blurRad="38100" dist="38100" dir="2700000" algn="tl">
+                    <a:srgbClr val="000000">
+                      <a:alpha val="43137"/>
+                    </a:srgbClr>
+                  </a:outerShdw>
+                </a:effectLst>
+                <a:latin typeface="Consolas" pitchFamily="49" charset="0"/>
+                <a:cs typeface="Consolas" pitchFamily="49" charset="0"/>
+              </a:rPr>
+              <a:t>'</a:t>
+            </a:r>
+            <a:r>
+              <a:rPr lang="en-US" b="1" noProof="1" smtClean="0">
+                <a:solidFill>
+                  <a:srgbClr val="8CF4F2"/>
+                </a:solidFill>
+                <a:effectLst>
+                  <a:outerShdw blurRad="38100" dist="38100" dir="2700000" algn="tl">
+                    <a:srgbClr val="000000">
+                      <a:alpha val="43137"/>
+                    </a:srgbClr>
+                  </a:outerShdw>
+                </a:effectLst>
+                <a:latin typeface="Consolas" pitchFamily="49" charset="0"/>
+                <a:cs typeface="Consolas" pitchFamily="49" charset="0"/>
+              </a:rPr>
+              <a:t>Number</a:t>
+            </a:r>
+            <a:r>
+              <a:rPr lang="en-US" b="1" noProof="1">
+                <a:solidFill>
+                  <a:srgbClr val="8CF4F2"/>
+                </a:solidFill>
+                <a:effectLst>
+                  <a:outerShdw blurRad="38100" dist="38100" dir="2700000" algn="tl">
+                    <a:srgbClr val="000000">
+                      <a:alpha val="43137"/>
+                    </a:srgbClr>
+                  </a:outerShdw>
+                </a:effectLst>
+                <a:latin typeface="Consolas" pitchFamily="49" charset="0"/>
+                <a:cs typeface="Consolas" pitchFamily="49" charset="0"/>
+              </a:rPr>
+              <a:t>: </a:t>
+            </a:r>
+            <a:r>
+              <a:rPr lang="en-US" b="1" noProof="1">
+                <a:solidFill>
+                  <a:srgbClr val="8CF4F2"/>
+                </a:solidFill>
+                <a:effectLst>
+                  <a:outerShdw blurRad="38100" dist="38100" dir="2700000" algn="tl">
+                    <a:srgbClr val="000000">
+                      <a:alpha val="43137"/>
+                    </a:srgbClr>
+                  </a:outerShdw>
+                </a:effectLst>
+                <a:latin typeface="Consolas" pitchFamily="49" charset="0"/>
+                <a:cs typeface="Consolas" pitchFamily="49" charset="0"/>
+              </a:rPr>
+              <a:t>'</a:t>
+            </a:r>
+            <a:r>
+              <a:rPr lang="en-US" b="1" noProof="1" smtClean="0">
+                <a:solidFill>
+                  <a:srgbClr val="8CF4F2"/>
+                </a:solidFill>
+                <a:effectLst>
+                  <a:outerShdw blurRad="38100" dist="38100" dir="2700000" algn="tl">
+                    <a:srgbClr val="000000">
+                      <a:alpha val="43137"/>
+                    </a:srgbClr>
+                  </a:outerShdw>
+                </a:effectLst>
+                <a:latin typeface="Consolas" pitchFamily="49" charset="0"/>
+                <a:cs typeface="Consolas" pitchFamily="49" charset="0"/>
+              </a:rPr>
+              <a:t> </a:t>
+            </a:r>
+            <a:r>
+              <a:rPr lang="en-US" b="1" noProof="1">
+                <a:solidFill>
+                  <a:srgbClr val="8CF4F2"/>
+                </a:solidFill>
+                <a:effectLst>
+                  <a:outerShdw blurRad="38100" dist="38100" dir="2700000" algn="tl">
+                    <a:srgbClr val="000000">
+                      <a:alpha val="43137"/>
+                    </a:srgbClr>
+                  </a:outerShdw>
+                </a:effectLst>
+                <a:latin typeface="Consolas" pitchFamily="49" charset="0"/>
+                <a:cs typeface="Consolas" pitchFamily="49" charset="0"/>
+              </a:rPr>
+              <a:t>+ value</a:t>
+            </a:r>
+            <a:r>
+              <a:rPr lang="en-US" b="1" noProof="1" smtClean="0">
+                <a:solidFill>
+                  <a:srgbClr val="8CF4F2"/>
+                </a:solidFill>
+                <a:effectLst>
+                  <a:outerShdw blurRad="38100" dist="38100" dir="2700000" algn="tl">
+                    <a:srgbClr val="000000">
+                      <a:alpha val="43137"/>
+                    </a:srgbClr>
+                  </a:outerShdw>
+                </a:effectLst>
+                <a:latin typeface="Consolas" pitchFamily="49" charset="0"/>
+                <a:cs typeface="Consolas" pitchFamily="49" charset="0"/>
+              </a:rPr>
+              <a:t>); break</a:t>
+            </a:r>
+            <a:r>
+              <a:rPr lang="en-US" b="1" noProof="1">
+                <a:solidFill>
+                  <a:srgbClr val="8CF4F2"/>
+                </a:solidFill>
+                <a:effectLst>
+                  <a:outerShdw blurRad="38100" dist="38100" dir="2700000" algn="tl">
+                    <a:srgbClr val="000000">
+                      <a:alpha val="43137"/>
+                    </a:srgbClr>
+                  </a:outerShdw>
+                </a:effectLst>
+                <a:latin typeface="Consolas" pitchFamily="49" charset="0"/>
+                <a:cs typeface="Consolas" pitchFamily="49" charset="0"/>
+              </a:rPr>
+              <a:t>;</a:t>
             </a:r>
           </a:p>
           <a:p>
@@ -23485,7 +26482,24 @@
                 <a:latin typeface="Consolas" pitchFamily="49" charset="0"/>
                 <a:cs typeface="Consolas" pitchFamily="49" charset="0"/>
               </a:rPr>
-              <a:t>printValue ("</a:t>
+              <a:t>printValue </a:t>
+            </a:r>
+            <a:r>
+              <a:rPr lang="en-US" b="1" noProof="1" smtClean="0">
+                <a:solidFill>
+                  <a:srgbClr val="8CF4F2"/>
+                </a:solidFill>
+                <a:effectLst>
+                  <a:outerShdw blurRad="38100" dist="38100" dir="2700000" algn="tl">
+                    <a:srgbClr val="000000">
+                      <a:alpha val="43137"/>
+                    </a:srgbClr>
+                  </a:outerShdw>
+                </a:effectLst>
+                <a:latin typeface="Consolas" pitchFamily="49" charset="0"/>
+                <a:cs typeface="Consolas" pitchFamily="49" charset="0"/>
+              </a:rPr>
+              <a:t>(</a:t>
             </a:r>
             <a:r>
               <a:rPr lang="en-US" b="1" noProof="1">
@@ -23502,8 +26516,73 @@
                 <a:latin typeface="Consolas" pitchFamily="49" charset="0"/>
                 <a:cs typeface="Consolas" pitchFamily="49" charset="0"/>
               </a:rPr>
-              <a:t>Lorem Ipsum");</a:t>
-            </a:r>
+              <a:t>'</a:t>
+            </a:r>
+            <a:r>
+              <a:rPr lang="en-US" b="1" noProof="1" smtClean="0">
+                <a:solidFill>
+                  <a:srgbClr val="8CF4F2"/>
+                </a:solidFill>
+                <a:effectLst>
+                  <a:outerShdw blurRad="38100" dist="38100" dir="2700000" algn="tl">
+                    <a:srgbClr val="000000">
+                      <a:alpha val="43137"/>
+                    </a:srgbClr>
+                  </a:outerShdw>
+                </a:effectLst>
+                <a:latin typeface="Consolas" pitchFamily="49" charset="0"/>
+                <a:cs typeface="Consolas" pitchFamily="49" charset="0"/>
+              </a:rPr>
+              <a:t>Lorem Ipsum</a:t>
+            </a:r>
+            <a:r>
+              <a:rPr lang="en-US" b="1" noProof="1">
+                <a:solidFill>
+                  <a:srgbClr val="8CF4F2"/>
+                </a:solidFill>
+                <a:effectLst>
+                  <a:outerShdw blurRad="38100" dist="38100" dir="2700000" algn="tl">
+                    <a:srgbClr val="000000">
+                      <a:alpha val="43137"/>
+                    </a:srgbClr>
+                  </a:outerShdw>
+                </a:effectLst>
+                <a:latin typeface="Consolas" pitchFamily="49" charset="0"/>
+                <a:cs typeface="Consolas" pitchFamily="49" charset="0"/>
+              </a:rPr>
+              <a:t>'</a:t>
+            </a:r>
+            <a:r>
+              <a:rPr lang="en-US" b="1" noProof="1" smtClean="0">
+                <a:solidFill>
+                  <a:srgbClr val="8CF4F2"/>
+                </a:solidFill>
+                <a:effectLst>
+                  <a:outerShdw blurRad="38100" dist="38100" dir="2700000" algn="tl">
+                    <a:srgbClr val="000000">
+                      <a:alpha val="43137"/>
+                    </a:srgbClr>
+                  </a:outerShdw>
+                </a:effectLst>
+                <a:latin typeface="Consolas" pitchFamily="49" charset="0"/>
+                <a:cs typeface="Consolas" pitchFamily="49" charset="0"/>
+              </a:rPr>
+              <a:t>);</a:t>
+            </a:r>
+            <a:endParaRPr lang="en-US" b="1" noProof="1">
+              <a:solidFill>
+                <a:srgbClr val="8CF4F2"/>
+              </a:solidFill>
+              <a:effectLst>
+                <a:outerShdw blurRad="38100" dist="38100" dir="2700000" algn="tl">
+                  <a:srgbClr val="000000">
+                    <a:alpha val="43137"/>
+                  </a:srgbClr>
+                </a:outerShdw>
+              </a:effectLst>
+              <a:latin typeface="Consolas" pitchFamily="49" charset="0"/>
+              <a:cs typeface="Consolas" pitchFamily="49" charset="0"/>
+            </a:endParaRPr>
           </a:p>
           <a:p>
             <a:pPr eaLnBrk="0" hangingPunct="0">
@@ -25963,7 +29042,24 @@
                 <a:latin typeface="Consolas" pitchFamily="49" charset="0"/>
                 <a:cs typeface="Consolas" pitchFamily="49" charset="0"/>
               </a:rPr>
-              <a:t>function printLogo(){</a:t>
+              <a:t>function printLogo</a:t>
+            </a:r>
+            <a:r>
+              <a:rPr lang="en-US" sz="2000" b="1" noProof="1" smtClean="0">
+                <a:solidFill>
+                  <a:srgbClr val="8CF4F2"/>
+                </a:solidFill>
+                <a:effectLst>
+                  <a:outerShdw blurRad="38100" dist="38100" dir="2700000" algn="tl">
+                    <a:srgbClr val="000000">
+                      <a:alpha val="43137"/>
+                    </a:srgbClr>
+                  </a:outerShdw>
+                </a:effectLst>
+                <a:latin typeface="Consolas" pitchFamily="49" charset="0"/>
+                <a:cs typeface="Consolas" pitchFamily="49" charset="0"/>
+              </a:rPr>
+              <a:t>() {</a:t>
             </a:r>
             <a:endParaRPr lang="en-US" sz="2000" b="1" noProof="1">
               <a:solidFill>
@@ -26011,7 +29107,24 @@
                 <a:latin typeface="Consolas" pitchFamily="49" charset="0"/>
                 <a:cs typeface="Consolas" pitchFamily="49" charset="0"/>
               </a:rPr>
-              <a:t>    console.log("Telerik </a:t>
+              <a:t>    </a:t>
+            </a:r>
+            <a:r>
+              <a:rPr lang="en-US" sz="2000" b="1" noProof="1" smtClean="0">
+                <a:solidFill>
+                  <a:srgbClr val="8CF4F2"/>
+                </a:solidFill>
+                <a:effectLst>
+                  <a:outerShdw blurRad="38100" dist="38100" dir="2700000" algn="tl">
+                    <a:srgbClr val="000000">
+                      <a:alpha val="43137"/>
+                    </a:srgbClr>
+                  </a:outerShdw>
+                </a:effectLst>
+                <a:latin typeface="Consolas" pitchFamily="49" charset="0"/>
+                <a:cs typeface="Consolas" pitchFamily="49" charset="0"/>
+              </a:rPr>
+              <a:t>console.log('Telerik </a:t>
             </a:r>
             <a:r>
               <a:rPr lang="en-US" sz="2000" b="1" noProof="1">
@@ -26028,8 +29141,39 @@
                 <a:latin typeface="Consolas" pitchFamily="49" charset="0"/>
                 <a:cs typeface="Consolas" pitchFamily="49" charset="0"/>
               </a:rPr>
-              <a:t>Corp.");</a:t>
-            </a:r>
+              <a:t>Corp</a:t>
+            </a:r>
+            <a:r>
+              <a:rPr lang="en-US" sz="2000" b="1" noProof="1" smtClean="0">
+                <a:solidFill>
+                  <a:srgbClr val="8CF4F2"/>
+                </a:solidFill>
+                <a:effectLst>
+                  <a:outerShdw blurRad="38100" dist="38100" dir="2700000" algn="tl">
+                    <a:srgbClr val="000000">
+                      <a:alpha val="43137"/>
+                    </a:srgbClr>
+                  </a:outerShdw>
+                </a:effectLst>
+                <a:latin typeface="Consolas" pitchFamily="49" charset="0"/>
+                <a:cs typeface="Consolas" pitchFamily="49" charset="0"/>
+              </a:rPr>
+              <a:t>.');</a:t>
+            </a:r>
+            <a:endParaRPr lang="en-US" sz="2000" b="1" noProof="1">
+              <a:solidFill>
+                <a:srgbClr val="8CF4F2"/>
+              </a:solidFill>
+              <a:effectLst>
+                <a:outerShdw blurRad="38100" dist="38100" dir="2700000" algn="tl">
+                  <a:srgbClr val="000000">
+                    <a:alpha val="43137"/>
+                  </a:srgbClr>
+                </a:outerShdw>
+              </a:effectLst>
+              <a:latin typeface="Consolas" pitchFamily="49" charset="0"/>
+              <a:cs typeface="Consolas" pitchFamily="49" charset="0"/>
+            </a:endParaRPr>
           </a:p>
           <a:p>
             <a:pPr eaLnBrk="0" hangingPunct="0">
@@ -26079,7 +29223,7 @@
                 <a:latin typeface="Consolas" pitchFamily="49" charset="0"/>
                 <a:cs typeface="Consolas" pitchFamily="49" charset="0"/>
               </a:rPr>
-              <a:t>console.log("www.telerik.com");</a:t>
+              <a:t>console.log('www.telerik.com');</a:t>
             </a:r>
             <a:endParaRPr lang="en-US" sz="2000" b="1" noProof="1">
               <a:solidFill>
@@ -26501,7 +29645,24 @@
                 <a:latin typeface="Consolas" pitchFamily="49" charset="0"/>
                 <a:cs typeface="Consolas" pitchFamily="49" charset="0"/>
               </a:rPr>
-              <a:t>function printLogo(){</a:t>
+              <a:t>function printLogo</a:t>
+            </a:r>
+            <a:r>
+              <a:rPr lang="en-US" sz="2000" b="1" noProof="1" smtClean="0">
+                <a:solidFill>
+                  <a:srgbClr val="8CF4F2"/>
+                </a:solidFill>
+                <a:effectLst>
+                  <a:outerShdw blurRad="38100" dist="38100" dir="2700000" algn="tl">
+                    <a:srgbClr val="000000">
+                      <a:alpha val="43137"/>
+                    </a:srgbClr>
+                  </a:outerShdw>
+                </a:effectLst>
+                <a:latin typeface="Consolas" pitchFamily="49" charset="0"/>
+                <a:cs typeface="Consolas" pitchFamily="49" charset="0"/>
+              </a:rPr>
+              <a:t>() {</a:t>
             </a:r>
             <a:endParaRPr lang="en-US" sz="2000" b="1" noProof="1">
               <a:solidFill>
@@ -26549,7 +29710,24 @@
                 <a:latin typeface="Consolas" pitchFamily="49" charset="0"/>
                 <a:cs typeface="Consolas" pitchFamily="49" charset="0"/>
               </a:rPr>
-              <a:t>    console.log("Telerik </a:t>
+              <a:t>    </a:t>
+            </a:r>
+            <a:r>
+              <a:rPr lang="en-US" sz="2000" b="1" noProof="1" smtClean="0">
+                <a:solidFill>
+                  <a:srgbClr val="8CF4F2"/>
+                </a:solidFill>
+                <a:effectLst>
+                  <a:outerShdw blurRad="38100" dist="38100" dir="2700000" algn="tl">
+                    <a:srgbClr val="000000">
+                      <a:alpha val="43137"/>
+                    </a:srgbClr>
+                  </a:outerShdw>
+                </a:effectLst>
+                <a:latin typeface="Consolas" pitchFamily="49" charset="0"/>
+                <a:cs typeface="Consolas" pitchFamily="49" charset="0"/>
+              </a:rPr>
+              <a:t>console.log('Telerik </a:t>
             </a:r>
             <a:r>
               <a:rPr lang="en-US" sz="2000" b="1" noProof="1">
@@ -26566,8 +29744,39 @@
                 <a:latin typeface="Consolas" pitchFamily="49" charset="0"/>
                 <a:cs typeface="Consolas" pitchFamily="49" charset="0"/>
               </a:rPr>
-              <a:t>Corp.");</a:t>
-            </a:r>
+              <a:t>Corp</a:t>
+            </a:r>
+            <a:r>
+              <a:rPr lang="en-US" sz="2000" b="1" noProof="1" smtClean="0">
+                <a:solidFill>
+                  <a:srgbClr val="8CF4F2"/>
+                </a:solidFill>
+                <a:effectLst>
+                  <a:outerShdw blurRad="38100" dist="38100" dir="2700000" algn="tl">
+                    <a:srgbClr val="000000">
+                      <a:alpha val="43137"/>
+                    </a:srgbClr>
+                  </a:outerShdw>
+                </a:effectLst>
+                <a:latin typeface="Consolas" pitchFamily="49" charset="0"/>
+                <a:cs typeface="Consolas" pitchFamily="49" charset="0"/>
+              </a:rPr>
+              <a:t>.');</a:t>
+            </a:r>
+            <a:endParaRPr lang="en-US" sz="2000" b="1" noProof="1">
+              <a:solidFill>
+                <a:srgbClr val="8CF4F2"/>
+              </a:solidFill>
+              <a:effectLst>
+                <a:outerShdw blurRad="38100" dist="38100" dir="2700000" algn="tl">
+                  <a:srgbClr val="000000">
+                    <a:alpha val="43137"/>
+                  </a:srgbClr>
+                </a:outerShdw>
+              </a:effectLst>
+              <a:latin typeface="Consolas" pitchFamily="49" charset="0"/>
+              <a:cs typeface="Consolas" pitchFamily="49" charset="0"/>
+            </a:endParaRPr>
           </a:p>
           <a:p>
             <a:pPr eaLnBrk="0" hangingPunct="0">
@@ -26617,7 +29826,41 @@
                 <a:latin typeface="Consolas" pitchFamily="49" charset="0"/>
                 <a:cs typeface="Consolas" pitchFamily="49" charset="0"/>
               </a:rPr>
-              <a:t>console.log("www.telerik.com");</a:t>
+              <a:t>console.log('www.telerik.com</a:t>
+            </a:r>
+            <a:r>
+              <a:rPr lang="en-US" sz="2000" b="1" noProof="1">
+                <a:solidFill>
+                  <a:srgbClr val="8CF4F2"/>
+                </a:solidFill>
+                <a:effectLst>
+                  <a:outerShdw blurRad="38100" dist="38100" dir="2700000" algn="tl">
+                    <a:srgbClr val="000000">
+                      <a:alpha val="43137"/>
+                    </a:srgbClr>
+                  </a:outerShdw>
+                </a:effectLst>
+                <a:latin typeface="Consolas" pitchFamily="49" charset="0"/>
+                <a:cs typeface="Consolas" pitchFamily="49" charset="0"/>
+              </a:rPr>
+              <a:t>'</a:t>
+            </a:r>
+            <a:r>
+              <a:rPr lang="en-US" sz="2000" b="1" noProof="1" smtClean="0">
+                <a:solidFill>
+                  <a:srgbClr val="8CF4F2"/>
+                </a:solidFill>
+                <a:effectLst>
+                  <a:outerShdw blurRad="38100" dist="38100" dir="2700000" algn="tl">
+                    <a:srgbClr val="000000">
+                      <a:alpha val="43137"/>
+                    </a:srgbClr>
+                  </a:outerShdw>
+                </a:effectLst>
+                <a:latin typeface="Consolas" pitchFamily="49" charset="0"/>
+                <a:cs typeface="Consolas" pitchFamily="49" charset="0"/>
+              </a:rPr>
+              <a:t>);</a:t>
             </a:r>
             <a:endParaRPr lang="en-US" sz="2000" b="1" noProof="1">
               <a:solidFill>
@@ -28021,7 +31264,7 @@
   <a:extraClrSchemeLst/>
   <a:extLst>
     <a:ext uri="{05A4C25C-085E-4340-85A3-A5531E510DB2}">
-      <thm15:themeFamily xmlns:thm15="http://schemas.microsoft.com/office/thememl/2012/main" xmlns="" name="Office Theme" id="{62F939B6-93AF-4DB8-9C6B-D6C7DFDC589F}" vid="{4A3C46E8-61CC-4603-A589-7422A47A8E4A}"/>
+      <thm15:themeFamily xmlns="" xmlns:thm15="http://schemas.microsoft.com/office/thememl/2012/main" name="Office Theme" id="{62F939B6-93AF-4DB8-9C6B-D6C7DFDC589F}" vid="{4A3C46E8-61CC-4603-A589-7422A47A8E4A}"/>
     </a:ext>
   </a:extLst>
 </a:theme>

</xml_diff>